<commit_message>
Updated async servers talk.
</commit_message>
<xml_diff>
--- a/Async Servers/Intro to Async ASP.NET - 16.9.pptx
+++ b/Async Servers/Intro to Async ASP.NET - 16.9.pptx
@@ -292,7 +292,7 @@
           <a:p>
             <a:fld id="{574E8BCA-0B4F-4373-B78E-3D2899449797}" type="datetimeFigureOut">
               <a:rPr lang="en-US" smtClean="0"/>
-              <a:t>3/22/2014</a:t>
+              <a:t>5/13/2014</a:t>
             </a:fld>
             <a:endParaRPr lang="en-US" dirty="0"/>
           </a:p>
@@ -2622,82 +2622,15 @@
           <a:bodyPr/>
           <a:lstStyle/>
           <a:p>
-            <a:pPr marL="171450" marR="0" indent="-171450" algn="l" defTabSz="914400" rtl="0" eaLnBrk="1" fontAlgn="auto" latinLnBrk="0" hangingPunct="1">
-              <a:lnSpc>
-                <a:spcPct val="100000"/>
-              </a:lnSpc>
-              <a:spcBef>
-                <a:spcPts val="0"/>
-              </a:spcBef>
-              <a:spcAft>
-                <a:spcPts val="0"/>
-              </a:spcAft>
-              <a:buClrTx/>
-              <a:buSzTx/>
-              <a:buFont typeface="Arial" panose="020B0604020202020204" pitchFamily="34" charset="0"/>
-              <a:buChar char="•"/>
-              <a:tabLst/>
-              <a:defRPr/>
-            </a:pPr>
-            <a:r>
-              <a:rPr lang="en-US" dirty="0" smtClean="0"/>
-              <a:t>Aborting</a:t>
-            </a:r>
-            <a:r>
-              <a:rPr lang="en-US" baseline="0" dirty="0" smtClean="0"/>
-              <a:t> is more important as our apps become more dependent on services (e.g., Azure retries with exponential </a:t>
-            </a:r>
-            <a:r>
-              <a:rPr lang="en-US" baseline="0" dirty="0" err="1" smtClean="0"/>
-              <a:t>backoff</a:t>
-            </a:r>
-            <a:r>
-              <a:rPr lang="en-US" baseline="0" dirty="0" smtClean="0"/>
-              <a:t>).</a:t>
-            </a:r>
-          </a:p>
-          <a:p>
-            <a:pPr marL="171450" marR="0" indent="-171450" algn="l" defTabSz="914400" rtl="0" eaLnBrk="1" fontAlgn="auto" latinLnBrk="0" hangingPunct="1">
-              <a:lnSpc>
-                <a:spcPct val="100000"/>
-              </a:lnSpc>
-              <a:spcBef>
-                <a:spcPts val="0"/>
-              </a:spcBef>
-              <a:spcAft>
-                <a:spcPts val="0"/>
-              </a:spcAft>
-              <a:buClrTx/>
-              <a:buSzTx/>
-              <a:buFont typeface="Arial" panose="020B0604020202020204" pitchFamily="34" charset="0"/>
-              <a:buChar char="•"/>
-              <a:tabLst/>
-              <a:defRPr/>
-            </a:pPr>
-            <a:r>
-              <a:rPr lang="en-US" baseline="0" dirty="0" err="1" smtClean="0"/>
-              <a:t>WebAPI</a:t>
-            </a:r>
-            <a:r>
-              <a:rPr lang="en-US" baseline="0" dirty="0" smtClean="0"/>
-              <a:t>/MVC/</a:t>
-            </a:r>
-            <a:r>
-              <a:rPr lang="en-US" baseline="0" dirty="0" err="1" smtClean="0"/>
-              <a:t>SignalR</a:t>
-            </a:r>
-            <a:r>
-              <a:rPr lang="en-US" baseline="0" dirty="0" smtClean="0"/>
-              <a:t> all pass you a </a:t>
-            </a:r>
-            <a:r>
-              <a:rPr lang="en-US" baseline="0" dirty="0" err="1" smtClean="0"/>
-              <a:t>CancellationToken</a:t>
-            </a:r>
-            <a:r>
-              <a:rPr lang="en-US" baseline="0" dirty="0" smtClean="0"/>
-              <a:t> directly and you don’t need to use these.</a:t>
-            </a:r>
+            <a:r>
+              <a:rPr lang="en-US" dirty="0" err="1" smtClean="0"/>
+              <a:t>DefaultConnectionLimit</a:t>
+            </a:r>
+            <a:r>
+              <a:rPr lang="en-US" dirty="0" smtClean="0"/>
+              <a:t> default = 12 * cores</a:t>
+            </a:r>
+            <a:endParaRPr lang="en-US" dirty="0"/>
           </a:p>
         </p:txBody>
       </p:sp>
@@ -2718,7 +2651,7 @@
           <a:p>
             <a:fld id="{94CE3395-F8FF-4336-B2AA-E15575B990E7}" type="slidenum">
               <a:rPr lang="en-US" smtClean="0"/>
-              <a:t>28</a:t>
+              <a:t>27</a:t>
             </a:fld>
             <a:endParaRPr lang="en-US" dirty="0"/>
           </a:p>
@@ -2727,7 +2660,7 @@
     </p:spTree>
     <p:extLst>
       <p:ext uri="{BB962C8B-B14F-4D97-AF65-F5344CB8AC3E}">
-        <p14:creationId xmlns:p14="http://schemas.microsoft.com/office/powerpoint/2010/main" val="208184616"/>
+        <p14:creationId xmlns:p14="http://schemas.microsoft.com/office/powerpoint/2010/main" val="2931656476"/>
       </p:ext>
     </p:extLst>
   </p:cSld>
@@ -2781,65 +2714,81 @@
           <a:bodyPr/>
           <a:lstStyle/>
           <a:p>
-            <a:r>
-              <a:rPr lang="en-US" dirty="0" smtClean="0">
-                <a:hlinkClick r:id="rId3"/>
-              </a:rPr>
-              <a:t>http://blogs.msdn.com/b/pfxteam/archive/2010/02/08/9960003.aspx</a:t>
-            </a:r>
-            <a:endParaRPr lang="en-US" baseline="0" dirty="0" smtClean="0"/>
-          </a:p>
-          <a:p>
-            <a:endParaRPr lang="en-US" baseline="0" dirty="0" smtClean="0"/>
-          </a:p>
-          <a:p>
+            <a:pPr marL="171450" marR="0" indent="-171450" algn="l" defTabSz="914400" rtl="0" eaLnBrk="1" fontAlgn="auto" latinLnBrk="0" hangingPunct="1">
+              <a:lnSpc>
+                <a:spcPct val="100000"/>
+              </a:lnSpc>
+              <a:spcBef>
+                <a:spcPts val="0"/>
+              </a:spcBef>
+              <a:spcAft>
+                <a:spcPts val="0"/>
+              </a:spcAft>
+              <a:buClrTx/>
+              <a:buSzTx/>
+              <a:buFont typeface="Arial" panose="020B0604020202020204" pitchFamily="34" charset="0"/>
+              <a:buChar char="•"/>
+              <a:tabLst/>
+              <a:defRPr/>
+            </a:pPr>
+            <a:r>
+              <a:rPr lang="en-US" dirty="0" smtClean="0"/>
+              <a:t>Aborting</a:t>
+            </a:r>
             <a:r>
               <a:rPr lang="en-US" baseline="0" dirty="0" smtClean="0"/>
-              <a:t>Concurrency is OK! It’s encouraged! But parallelism not so much.</a:t>
-            </a:r>
-            <a:endParaRPr lang="en-US" dirty="0" smtClean="0"/>
-          </a:p>
-          <a:p>
-            <a:endParaRPr lang="en-US" dirty="0" smtClean="0"/>
-          </a:p>
-          <a:p>
-            <a:r>
-              <a:rPr lang="en-US" dirty="0" smtClean="0"/>
-              <a:t>Parallel code will use multiple threads per request instead of one</a:t>
+              <a:t> is more important as our apps become more dependent on services (e.g., Azure retries with exponential </a:t>
+            </a:r>
+            <a:r>
+              <a:rPr lang="en-US" baseline="0" dirty="0" err="1" smtClean="0"/>
+              <a:t>backoff</a:t>
             </a:r>
             <a:r>
               <a:rPr lang="en-US" baseline="0" dirty="0" smtClean="0"/>
-              <a:t> thread handling multiple requests.</a:t>
-            </a:r>
-            <a:endParaRPr lang="en-US" dirty="0" smtClean="0"/>
-          </a:p>
-          <a:p>
-            <a:endParaRPr lang="en-US" dirty="0" smtClean="0"/>
-          </a:p>
-          <a:p>
-            <a:r>
-              <a:rPr lang="en-US" dirty="0" smtClean="0"/>
-              <a:t>Parallelism cannot use </a:t>
-            </a:r>
-            <a:r>
-              <a:rPr lang="en-US" dirty="0" err="1" smtClean="0"/>
-              <a:t>SynchronizationContext</a:t>
-            </a:r>
-            <a:r>
-              <a:rPr lang="en-US" dirty="0" smtClean="0"/>
-              <a:t>,</a:t>
+              <a:t>).</a:t>
+            </a:r>
+          </a:p>
+          <a:p>
+            <a:pPr marL="171450" marR="0" indent="-171450" algn="l" defTabSz="914400" rtl="0" eaLnBrk="1" fontAlgn="auto" latinLnBrk="0" hangingPunct="1">
+              <a:lnSpc>
+                <a:spcPct val="100000"/>
+              </a:lnSpc>
+              <a:spcBef>
+                <a:spcPts val="0"/>
+              </a:spcBef>
+              <a:spcAft>
+                <a:spcPts val="0"/>
+              </a:spcAft>
+              <a:buClrTx/>
+              <a:buSzTx/>
+              <a:buFont typeface="Arial" panose="020B0604020202020204" pitchFamily="34" charset="0"/>
+              <a:buChar char="•"/>
+              <a:tabLst/>
+              <a:defRPr/>
+            </a:pPr>
+            <a:r>
+              <a:rPr lang="en-US" baseline="0" dirty="0" err="1" smtClean="0"/>
+              <a:t>WebAPI</a:t>
             </a:r>
             <a:r>
               <a:rPr lang="en-US" baseline="0" dirty="0" smtClean="0"/>
-              <a:t> so you can’t use </a:t>
+              <a:t>/MVC/</a:t>
             </a:r>
             <a:r>
               <a:rPr lang="en-US" baseline="0" dirty="0" err="1" smtClean="0"/>
-              <a:t>HttpContext.Current</a:t>
+              <a:t>SignalR</a:t>
             </a:r>
             <a:r>
               <a:rPr lang="en-US" baseline="0" dirty="0" smtClean="0"/>
-              <a:t> or Culture settings.</a:t>
+              <a:t> all pass you a </a:t>
+            </a:r>
+            <a:r>
+              <a:rPr lang="en-US" baseline="0" dirty="0" err="1" smtClean="0"/>
+              <a:t>CancellationToken</a:t>
+            </a:r>
+            <a:r>
+              <a:rPr lang="en-US" baseline="0" dirty="0" smtClean="0"/>
+              <a:t> directly and you don’t need to use these.</a:t>
             </a:r>
           </a:p>
         </p:txBody>
@@ -2861,7 +2810,7 @@
           <a:p>
             <a:fld id="{94CE3395-F8FF-4336-B2AA-E15575B990E7}" type="slidenum">
               <a:rPr lang="en-US" smtClean="0"/>
-              <a:t>29</a:t>
+              <a:t>28</a:t>
             </a:fld>
             <a:endParaRPr lang="en-US" dirty="0"/>
           </a:p>
@@ -2870,7 +2819,7 @@
     </p:spTree>
     <p:extLst>
       <p:ext uri="{BB962C8B-B14F-4D97-AF65-F5344CB8AC3E}">
-        <p14:creationId xmlns:p14="http://schemas.microsoft.com/office/powerpoint/2010/main" val="568885836"/>
+        <p14:creationId xmlns:p14="http://schemas.microsoft.com/office/powerpoint/2010/main" val="208184616"/>
       </p:ext>
     </p:extLst>
   </p:cSld>
@@ -2924,118 +2873,66 @@
           <a:bodyPr/>
           <a:lstStyle/>
           <a:p>
-            <a:pPr marL="0" marR="0" lvl="1" indent="0" algn="l" defTabSz="914400" rtl="0" eaLnBrk="1" fontAlgn="auto" latinLnBrk="0" hangingPunct="1">
-              <a:lnSpc>
-                <a:spcPct val="100000"/>
-              </a:lnSpc>
-              <a:spcBef>
-                <a:spcPts val="0"/>
-              </a:spcBef>
-              <a:spcAft>
-                <a:spcPts val="0"/>
-              </a:spcAft>
-              <a:buClrTx/>
-              <a:buSzTx/>
-              <a:buFontTx/>
-              <a:buNone/>
-              <a:tabLst/>
-              <a:defRPr/>
-            </a:pPr>
-            <a:r>
-              <a:rPr lang="en-US" dirty="0" smtClean="0"/>
-              <a:t>Fake asynchronous methods consume</a:t>
-            </a:r>
+            <a:r>
+              <a:rPr lang="en-US" dirty="0" smtClean="0">
+                <a:hlinkClick r:id="rId3"/>
+              </a:rPr>
+              <a:t>http://blogs.msdn.com/b/pfxteam/archive/2010/02/08/9960003.aspx</a:t>
+            </a:r>
+            <a:endParaRPr lang="en-US" baseline="0" dirty="0" smtClean="0"/>
+          </a:p>
+          <a:p>
+            <a:endParaRPr lang="en-US" baseline="0" dirty="0" smtClean="0"/>
+          </a:p>
+          <a:p>
             <a:r>
               <a:rPr lang="en-US" baseline="0" dirty="0" smtClean="0"/>
-              <a:t> a thread pool thread so they </a:t>
-            </a:r>
-            <a:r>
-              <a:rPr lang="en-US" i="1" baseline="0" dirty="0" smtClean="0"/>
-              <a:t>appear</a:t>
+              <a:t>Concurrency is OK! It’s encouraged! But parallelism not so much.</a:t>
+            </a:r>
+            <a:endParaRPr lang="en-US" dirty="0" smtClean="0"/>
+          </a:p>
+          <a:p>
+            <a:endParaRPr lang="en-US" dirty="0" smtClean="0"/>
+          </a:p>
+          <a:p>
+            <a:r>
+              <a:rPr lang="en-US" dirty="0" smtClean="0"/>
+              <a:t>Parallel code will use multiple threads per request instead of one</a:t>
             </a:r>
             <a:r>
               <a:rPr lang="en-US" baseline="0" dirty="0" smtClean="0"/>
-              <a:t> asynchronous. In this example, our methods are assuming that the </a:t>
+              <a:t> thread handling multiple requests.</a:t>
+            </a:r>
+            <a:endParaRPr lang="en-US" dirty="0" smtClean="0"/>
+          </a:p>
+          <a:p>
+            <a:endParaRPr lang="en-US" dirty="0" smtClean="0"/>
+          </a:p>
+          <a:p>
+            <a:r>
+              <a:rPr lang="en-US" dirty="0" smtClean="0"/>
+              <a:t>Parallelism cannot use </a:t>
+            </a:r>
+            <a:r>
+              <a:rPr lang="en-US" dirty="0" err="1" smtClean="0"/>
+              <a:t>SynchronizationContext</a:t>
+            </a:r>
+            <a:r>
+              <a:rPr lang="en-US" dirty="0" smtClean="0"/>
+              <a:t>,</a:t>
+            </a:r>
+            <a:r>
+              <a:rPr lang="en-US" baseline="0" dirty="0" smtClean="0"/>
+              <a:t> so you can’t use </a:t>
             </a:r>
             <a:r>
               <a:rPr lang="en-US" baseline="0" dirty="0" err="1" smtClean="0"/>
-              <a:t>async</a:t>
+              <a:t>HttpContext.Current</a:t>
             </a:r>
             <a:r>
               <a:rPr lang="en-US" baseline="0" dirty="0" smtClean="0"/>
-              <a:t> stream methods are actually </a:t>
-            </a:r>
-            <a:r>
-              <a:rPr lang="en-US" baseline="0" dirty="0" err="1" smtClean="0"/>
-              <a:t>async</a:t>
-            </a:r>
-            <a:r>
-              <a:rPr lang="en-US" baseline="0" dirty="0" smtClean="0"/>
-              <a:t>, but they’re not; internally, they’re </a:t>
-            </a:r>
-            <a:r>
-              <a:rPr lang="en-US" baseline="0" dirty="0" err="1" smtClean="0"/>
-              <a:t>queueing</a:t>
-            </a:r>
-            <a:r>
-              <a:rPr lang="en-US" baseline="0" dirty="0" smtClean="0"/>
-              <a:t> synchronous work to the thread pool (e.g., </a:t>
-            </a:r>
-            <a:r>
-              <a:rPr lang="en-US" baseline="0" dirty="0" err="1" smtClean="0"/>
-              <a:t>Task.Run</a:t>
-            </a:r>
-            <a:r>
-              <a:rPr lang="en-US" baseline="0" dirty="0" smtClean="0"/>
-              <a:t>).</a:t>
-            </a:r>
-          </a:p>
-          <a:p>
-            <a:pPr marL="0" marR="0" lvl="1" indent="0" algn="l" defTabSz="914400" rtl="0" eaLnBrk="1" fontAlgn="auto" latinLnBrk="0" hangingPunct="1">
-              <a:lnSpc>
-                <a:spcPct val="100000"/>
-              </a:lnSpc>
-              <a:spcBef>
-                <a:spcPts val="0"/>
-              </a:spcBef>
-              <a:spcAft>
-                <a:spcPts val="0"/>
-              </a:spcAft>
-              <a:buClrTx/>
-              <a:buSzTx/>
-              <a:buFontTx/>
-              <a:buNone/>
-              <a:tabLst/>
-              <a:defRPr/>
-            </a:pPr>
-            <a:r>
-              <a:rPr lang="en-US" baseline="0" dirty="0" smtClean="0"/>
-              <a:t>This means extra thread swapping (inefficient) and using a thread for the entire request (kills scalability).</a:t>
-            </a:r>
-          </a:p>
-          <a:p>
-            <a:pPr marL="0" marR="0" lvl="1" indent="0" algn="l" defTabSz="914400" rtl="0" eaLnBrk="1" fontAlgn="auto" latinLnBrk="0" hangingPunct="1">
-              <a:lnSpc>
-                <a:spcPct val="100000"/>
-              </a:lnSpc>
-              <a:spcBef>
-                <a:spcPts val="0"/>
-              </a:spcBef>
-              <a:spcAft>
-                <a:spcPts val="0"/>
-              </a:spcAft>
-              <a:buClrTx/>
-              <a:buSzTx/>
-              <a:buFontTx/>
-              <a:buNone/>
-              <a:tabLst/>
-              <a:defRPr/>
-            </a:pPr>
-            <a:r>
-              <a:rPr lang="en-US" baseline="0" dirty="0" smtClean="0"/>
-              <a:t>At no point does this request have all its threads free! It is always using at least one thread.</a:t>
-            </a:r>
-            <a:endParaRPr lang="en-US" dirty="0" smtClean="0"/>
+              <a:t> or Culture settings.</a:t>
+            </a:r>
           </a:p>
         </p:txBody>
       </p:sp>
@@ -3056,7 +2953,7 @@
           <a:p>
             <a:fld id="{94CE3395-F8FF-4336-B2AA-E15575B990E7}" type="slidenum">
               <a:rPr lang="en-US" smtClean="0"/>
-              <a:t>30</a:t>
+              <a:t>29</a:t>
             </a:fld>
             <a:endParaRPr lang="en-US" dirty="0"/>
           </a:p>
@@ -3065,7 +2962,7 @@
     </p:spTree>
     <p:extLst>
       <p:ext uri="{BB962C8B-B14F-4D97-AF65-F5344CB8AC3E}">
-        <p14:creationId xmlns:p14="http://schemas.microsoft.com/office/powerpoint/2010/main" val="1717056282"/>
+        <p14:creationId xmlns:p14="http://schemas.microsoft.com/office/powerpoint/2010/main" val="568885836"/>
       </p:ext>
     </p:extLst>
   </p:cSld>
@@ -3119,7 +3016,7 @@
           <a:bodyPr/>
           <a:lstStyle/>
           <a:p>
-            <a:pPr marL="171450" marR="0" indent="-171450" algn="l" defTabSz="914400" rtl="0" eaLnBrk="1" fontAlgn="auto" latinLnBrk="0" hangingPunct="1">
+            <a:pPr marL="0" marR="0" lvl="1" indent="0" algn="l" defTabSz="914400" rtl="0" eaLnBrk="1" fontAlgn="auto" latinLnBrk="0" hangingPunct="1">
               <a:lnSpc>
                 <a:spcPct val="100000"/>
               </a:lnSpc>
@@ -3131,23 +3028,62 @@
               </a:spcAft>
               <a:buClrTx/>
               <a:buSzTx/>
-              <a:buFont typeface="Arial" panose="020B0604020202020204" pitchFamily="34" charset="0"/>
-              <a:buChar char="•"/>
+              <a:buFontTx/>
+              <a:buNone/>
               <a:tabLst/>
               <a:defRPr/>
             </a:pPr>
             <a:r>
               <a:rPr lang="en-US" dirty="0" smtClean="0"/>
-              <a:t>EAP =</a:t>
+              <a:t>Fake asynchronous methods consume</a:t>
             </a:r>
             <a:r>
               <a:rPr lang="en-US" baseline="0" dirty="0" smtClean="0"/>
-              <a:t> Event-based Asynchronous Programming.</a:t>
-            </a:r>
-            <a:endParaRPr lang="en-US" dirty="0" smtClean="0"/>
-          </a:p>
-          <a:p>
-            <a:pPr marL="171450" marR="0" indent="-171450" algn="l" defTabSz="914400" rtl="0" eaLnBrk="1" fontAlgn="auto" latinLnBrk="0" hangingPunct="1">
+              <a:t> a thread pool thread so they </a:t>
+            </a:r>
+            <a:r>
+              <a:rPr lang="en-US" i="1" baseline="0" dirty="0" smtClean="0"/>
+              <a:t>appear</a:t>
+            </a:r>
+            <a:r>
+              <a:rPr lang="en-US" baseline="0" dirty="0" smtClean="0"/>
+              <a:t> asynchronous. In this example, our methods are assuming that the </a:t>
+            </a:r>
+            <a:r>
+              <a:rPr lang="en-US" baseline="0" dirty="0" err="1" smtClean="0"/>
+              <a:t>async</a:t>
+            </a:r>
+            <a:r>
+              <a:rPr lang="en-US" baseline="0" dirty="0" smtClean="0"/>
+              <a:t> stream methods are actually </a:t>
+            </a:r>
+            <a:r>
+              <a:rPr lang="en-US" baseline="0" dirty="0" err="1" smtClean="0"/>
+              <a:t>async</a:t>
+            </a:r>
+            <a:r>
+              <a:rPr lang="en-US" baseline="0" dirty="0" smtClean="0"/>
+              <a:t>, but they’re not; internally, they’re </a:t>
+            </a:r>
+            <a:r>
+              <a:rPr lang="en-US" baseline="0" dirty="0" err="1" smtClean="0"/>
+              <a:t>queueing</a:t>
+            </a:r>
+            <a:r>
+              <a:rPr lang="en-US" baseline="0" dirty="0" smtClean="0"/>
+              <a:t> synchronous work to the thread pool (e.g., </a:t>
+            </a:r>
+            <a:r>
+              <a:rPr lang="en-US" baseline="0" dirty="0" err="1" smtClean="0"/>
+              <a:t>Task.Run</a:t>
+            </a:r>
+            <a:r>
+              <a:rPr lang="en-US" baseline="0" dirty="0" smtClean="0"/>
+              <a:t>).</a:t>
+            </a:r>
+          </a:p>
+          <a:p>
+            <a:pPr marL="0" marR="0" lvl="1" indent="0" algn="l" defTabSz="914400" rtl="0" eaLnBrk="1" fontAlgn="auto" latinLnBrk="0" hangingPunct="1">
               <a:lnSpc>
                 <a:spcPct val="100000"/>
               </a:lnSpc>
@@ -3159,34 +3095,18 @@
               </a:spcAft>
               <a:buClrTx/>
               <a:buSzTx/>
-              <a:buFont typeface="Arial" panose="020B0604020202020204" pitchFamily="34" charset="0"/>
-              <a:buChar char="•"/>
+              <a:buFontTx/>
+              <a:buNone/>
               <a:tabLst/>
               <a:defRPr/>
             </a:pPr>
             <a:r>
-              <a:rPr lang="en-US" dirty="0" smtClean="0"/>
-              <a:t>Replace </a:t>
-            </a:r>
-            <a:r>
-              <a:rPr lang="en-US" dirty="0" err="1" smtClean="0"/>
-              <a:t>WebClient</a:t>
-            </a:r>
-            <a:r>
-              <a:rPr lang="en-US" dirty="0" smtClean="0"/>
-              <a:t> (EAP) with </a:t>
-            </a:r>
-            <a:r>
-              <a:rPr lang="en-US" dirty="0" err="1" smtClean="0"/>
-              <a:t>HttpClient</a:t>
-            </a:r>
-            <a:r>
-              <a:rPr lang="en-US" dirty="0" smtClean="0"/>
-              <a:t> (TAP).</a:t>
-            </a:r>
-          </a:p>
-          <a:p>
-            <a:pPr marL="171450" marR="0" indent="-171450" algn="l" defTabSz="914400" rtl="0" eaLnBrk="1" fontAlgn="auto" latinLnBrk="0" hangingPunct="1">
+              <a:rPr lang="en-US" baseline="0" dirty="0" smtClean="0"/>
+              <a:t>This means extra thread swapping (inefficient) and using a thread for the entire request (kills scalability).</a:t>
+            </a:r>
+          </a:p>
+          <a:p>
+            <a:pPr marL="0" marR="0" lvl="1" indent="0" algn="l" defTabSz="914400" rtl="0" eaLnBrk="1" fontAlgn="auto" latinLnBrk="0" hangingPunct="1">
               <a:lnSpc>
                 <a:spcPct val="100000"/>
               </a:lnSpc>
@@ -3198,23 +3118,16 @@
               </a:spcAft>
               <a:buClrTx/>
               <a:buSzTx/>
-              <a:buFont typeface="Arial" panose="020B0604020202020204" pitchFamily="34" charset="0"/>
-              <a:buChar char="•"/>
+              <a:buFontTx/>
+              <a:buNone/>
               <a:tabLst/>
               <a:defRPr/>
             </a:pPr>
             <a:r>
-              <a:rPr lang="en-US" dirty="0" smtClean="0"/>
-              <a:t>For </a:t>
-            </a:r>
-            <a:r>
-              <a:rPr lang="en-US" dirty="0" err="1" smtClean="0"/>
-              <a:t>SmtpClient</a:t>
-            </a:r>
-            <a:r>
-              <a:rPr lang="en-US" dirty="0" smtClean="0"/>
-              <a:t>, use a method I’ll be posting on my blog shortly.</a:t>
-            </a:r>
+              <a:rPr lang="en-US" baseline="0" dirty="0" smtClean="0"/>
+              <a:t>At no point does this request have all its threads free! It is always using at least one thread.</a:t>
+            </a:r>
+            <a:endParaRPr lang="en-US" dirty="0" smtClean="0"/>
           </a:p>
         </p:txBody>
       </p:sp>
@@ -3235,7 +3148,7 @@
           <a:p>
             <a:fld id="{94CE3395-F8FF-4336-B2AA-E15575B990E7}" type="slidenum">
               <a:rPr lang="en-US" smtClean="0"/>
-              <a:t>32</a:t>
+              <a:t>30</a:t>
             </a:fld>
             <a:endParaRPr lang="en-US" dirty="0"/>
           </a:p>
@@ -3244,7 +3157,7 @@
     </p:spTree>
     <p:extLst>
       <p:ext uri="{BB962C8B-B14F-4D97-AF65-F5344CB8AC3E}">
-        <p14:creationId xmlns:p14="http://schemas.microsoft.com/office/powerpoint/2010/main" val="2504897479"/>
+        <p14:creationId xmlns:p14="http://schemas.microsoft.com/office/powerpoint/2010/main" val="1717056282"/>
       </p:ext>
     </p:extLst>
   </p:cSld>
@@ -3298,45 +3211,103 @@
           <a:bodyPr/>
           <a:lstStyle/>
           <a:p>
-            <a:pPr marL="171450" indent="-171450">
+            <a:pPr marL="171450" marR="0" indent="-171450" algn="l" defTabSz="914400" rtl="0" eaLnBrk="1" fontAlgn="auto" latinLnBrk="0" hangingPunct="1">
+              <a:lnSpc>
+                <a:spcPct val="100000"/>
+              </a:lnSpc>
+              <a:spcBef>
+                <a:spcPts val="0"/>
+              </a:spcBef>
+              <a:spcAft>
+                <a:spcPts val="0"/>
+              </a:spcAft>
+              <a:buClrTx/>
+              <a:buSzTx/>
               <a:buFont typeface="Arial" panose="020B0604020202020204" pitchFamily="34" charset="0"/>
               <a:buChar char="•"/>
+              <a:tabLst/>
+              <a:defRPr/>
             </a:pPr>
             <a:r>
               <a:rPr lang="en-US" dirty="0" smtClean="0"/>
-              <a:t>Logical Get/Set Data is </a:t>
+              <a:t>EAP =</a:t>
             </a:r>
             <a:r>
               <a:rPr lang="en-US" baseline="0" dirty="0" smtClean="0"/>
-              <a:t>more portable than Items </a:t>
-            </a:r>
-            <a:r>
-              <a:rPr lang="en-US" i="1" baseline="0" dirty="0" smtClean="0"/>
-              <a:t>and</a:t>
-            </a:r>
-            <a:r>
-              <a:rPr lang="en-US" baseline="0" dirty="0" smtClean="0"/>
-              <a:t> flows outside the request context.</a:t>
-            </a:r>
-          </a:p>
-          <a:p>
-            <a:pPr marL="171450" indent="-171450">
+              <a:t> Event-based Asynchronous Programming.</a:t>
+            </a:r>
+            <a:endParaRPr lang="en-US" dirty="0" smtClean="0"/>
+          </a:p>
+          <a:p>
+            <a:pPr marL="171450" marR="0" indent="-171450" algn="l" defTabSz="914400" rtl="0" eaLnBrk="1" fontAlgn="auto" latinLnBrk="0" hangingPunct="1">
+              <a:lnSpc>
+                <a:spcPct val="100000"/>
+              </a:lnSpc>
+              <a:spcBef>
+                <a:spcPts val="0"/>
+              </a:spcBef>
+              <a:spcAft>
+                <a:spcPts val="0"/>
+              </a:spcAft>
+              <a:buClrTx/>
+              <a:buSzTx/>
               <a:buFont typeface="Arial" panose="020B0604020202020204" pitchFamily="34" charset="0"/>
               <a:buChar char="•"/>
+              <a:tabLst/>
+              <a:defRPr/>
             </a:pPr>
             <a:r>
+              <a:rPr lang="en-US" dirty="0" smtClean="0"/>
+              <a:t>Replace </a:t>
+            </a:r>
+            <a:r>
+              <a:rPr lang="en-US" dirty="0" err="1" smtClean="0"/>
+              <a:t>WebClient</a:t>
+            </a:r>
+            <a:r>
+              <a:rPr lang="en-US" dirty="0" smtClean="0"/>
+              <a:t> (EAP) with </a:t>
+            </a:r>
+            <a:r>
+              <a:rPr lang="en-US" dirty="0" err="1" smtClean="0"/>
+              <a:t>HttpClient</a:t>
+            </a:r>
+            <a:r>
+              <a:rPr lang="en-US" dirty="0" smtClean="0"/>
+              <a:t> (TAP).</a:t>
+            </a:r>
+          </a:p>
+          <a:p>
+            <a:pPr marL="171450" marR="0" indent="-171450" algn="l" defTabSz="914400" rtl="0" eaLnBrk="1" fontAlgn="auto" latinLnBrk="0" hangingPunct="1">
+              <a:lnSpc>
+                <a:spcPct val="100000"/>
+              </a:lnSpc>
+              <a:spcBef>
+                <a:spcPts val="0"/>
+              </a:spcBef>
+              <a:spcAft>
+                <a:spcPts val="0"/>
+              </a:spcAft>
+              <a:buClrTx/>
+              <a:buSzTx/>
+              <a:buFont typeface="Arial" panose="020B0604020202020204" pitchFamily="34" charset="0"/>
+              <a:buChar char="•"/>
+              <a:tabLst/>
+              <a:defRPr/>
+            </a:pPr>
+            <a:r>
+              <a:rPr lang="en-US" smtClean="0"/>
+              <a:t>EAP</a:t>
+            </a:r>
+            <a:r>
+              <a:rPr lang="en-US" baseline="0" smtClean="0"/>
+              <a:t> </a:t>
+            </a:r>
+            <a:r>
               <a:rPr lang="en-US" baseline="0" dirty="0" smtClean="0"/>
-              <a:t>However, you should only store immutable data there. </a:t>
-            </a:r>
-            <a:r>
-              <a:rPr lang="en-US" baseline="0" dirty="0" err="1" smtClean="0"/>
-              <a:t>Microsoft.Bcl.Immutable</a:t>
-            </a:r>
-            <a:r>
-              <a:rPr lang="en-US" baseline="0" dirty="0" smtClean="0"/>
-              <a:t>.</a:t>
-            </a:r>
-            <a:endParaRPr lang="en-US" dirty="0"/>
+              <a:t>works fine on ASP.NET if the handler is asynchronous.</a:t>
+            </a:r>
+            <a:endParaRPr lang="en-US" dirty="0" smtClean="0"/>
           </a:p>
         </p:txBody>
       </p:sp>
@@ -3357,7 +3328,7 @@
           <a:p>
             <a:fld id="{94CE3395-F8FF-4336-B2AA-E15575B990E7}" type="slidenum">
               <a:rPr lang="en-US" smtClean="0"/>
-              <a:t>33</a:t>
+              <a:t>32</a:t>
             </a:fld>
             <a:endParaRPr lang="en-US" dirty="0"/>
           </a:p>
@@ -3366,7 +3337,7 @@
     </p:spTree>
     <p:extLst>
       <p:ext uri="{BB962C8B-B14F-4D97-AF65-F5344CB8AC3E}">
-        <p14:creationId xmlns:p14="http://schemas.microsoft.com/office/powerpoint/2010/main" val="74889723"/>
+        <p14:creationId xmlns:p14="http://schemas.microsoft.com/office/powerpoint/2010/main" val="2504897479"/>
       </p:ext>
     </p:extLst>
   </p:cSld>
@@ -3426,7 +3397,19 @@
             </a:pPr>
             <a:r>
               <a:rPr lang="en-US" dirty="0" smtClean="0"/>
-              <a:t>Your situation is not unique.</a:t>
+              <a:t>Logical Get/Set Data is </a:t>
+            </a:r>
+            <a:r>
+              <a:rPr lang="en-US" baseline="0" dirty="0" smtClean="0"/>
+              <a:t>more portable than Items </a:t>
+            </a:r>
+            <a:r>
+              <a:rPr lang="en-US" i="1" baseline="0" dirty="0" smtClean="0"/>
+              <a:t>and</a:t>
+            </a:r>
+            <a:r>
+              <a:rPr lang="en-US" baseline="0" dirty="0" smtClean="0"/>
+              <a:t> flows outside the request context.</a:t>
             </a:r>
           </a:p>
           <a:p>
@@ -3435,8 +3418,16 @@
               <a:buChar char="•"/>
             </a:pPr>
             <a:r>
-              <a:rPr lang="en-US" dirty="0" smtClean="0"/>
-              <a:t>Your company is not a precious little snowflake.</a:t>
+              <a:rPr lang="en-US" baseline="0" dirty="0" smtClean="0"/>
+              <a:t>However, you should only store immutable data there. </a:t>
+            </a:r>
+            <a:r>
+              <a:rPr lang="en-US" baseline="0" dirty="0" err="1" smtClean="0"/>
+              <a:t>Microsoft.Bcl.Immutable</a:t>
+            </a:r>
+            <a:r>
+              <a:rPr lang="en-US" baseline="0" dirty="0" smtClean="0"/>
+              <a:t>.</a:t>
             </a:r>
             <a:endParaRPr lang="en-US" dirty="0"/>
           </a:p>
@@ -3459,7 +3450,7 @@
           <a:p>
             <a:fld id="{94CE3395-F8FF-4336-B2AA-E15575B990E7}" type="slidenum">
               <a:rPr lang="en-US" smtClean="0"/>
-              <a:t>34</a:t>
+              <a:t>33</a:t>
             </a:fld>
             <a:endParaRPr lang="en-US" dirty="0"/>
           </a:p>
@@ -3468,7 +3459,7 @@
     </p:spTree>
     <p:extLst>
       <p:ext uri="{BB962C8B-B14F-4D97-AF65-F5344CB8AC3E}">
-        <p14:creationId xmlns:p14="http://schemas.microsoft.com/office/powerpoint/2010/main" val="1813778683"/>
+        <p14:creationId xmlns:p14="http://schemas.microsoft.com/office/powerpoint/2010/main" val="74889723"/>
       </p:ext>
     </p:extLst>
   </p:cSld>
@@ -3662,42 +3653,23 @@
           <a:bodyPr/>
           <a:lstStyle/>
           <a:p>
-            <a:r>
-              <a:rPr lang="en-US" baseline="0" dirty="0" smtClean="0"/>
-              <a:t>Code on my blog will track </a:t>
-            </a:r>
-            <a:r>
-              <a:rPr lang="en-US" baseline="0" dirty="0" err="1" smtClean="0"/>
-              <a:t>async</a:t>
-            </a:r>
-            <a:r>
-              <a:rPr lang="en-US" baseline="0" dirty="0" smtClean="0"/>
-              <a:t>/sync tasks executing outside the request context and notify ASP.NET that they’re running. Also publishes a </a:t>
-            </a:r>
-            <a:r>
-              <a:rPr lang="en-US" baseline="0" dirty="0" err="1" smtClean="0"/>
-              <a:t>CancellationToken</a:t>
-            </a:r>
-            <a:r>
-              <a:rPr lang="en-US" baseline="0" dirty="0" smtClean="0"/>
-              <a:t> which is set when ASP.NET has requested the </a:t>
-            </a:r>
-            <a:r>
-              <a:rPr lang="en-US" baseline="0" dirty="0" err="1" smtClean="0"/>
-              <a:t>AppDomain</a:t>
-            </a:r>
-            <a:r>
-              <a:rPr lang="en-US" baseline="0" dirty="0" smtClean="0"/>
-              <a:t> to exit.</a:t>
-            </a:r>
-          </a:p>
-          <a:p>
-            <a:endParaRPr lang="en-US" baseline="0" dirty="0" smtClean="0"/>
-          </a:p>
-          <a:p>
-            <a:r>
-              <a:rPr lang="en-US" baseline="0" dirty="0" smtClean="0"/>
-              <a:t>But don’t use this unless you are perfectly fine with the task never being executed!</a:t>
+            <a:pPr marL="171450" indent="-171450">
+              <a:buFont typeface="Arial" panose="020B0604020202020204" pitchFamily="34" charset="0"/>
+              <a:buChar char="•"/>
+            </a:pPr>
+            <a:r>
+              <a:rPr lang="en-US" dirty="0" smtClean="0"/>
+              <a:t>Your situation is not unique.</a:t>
+            </a:r>
+          </a:p>
+          <a:p>
+            <a:pPr marL="171450" indent="-171450">
+              <a:buFont typeface="Arial" panose="020B0604020202020204" pitchFamily="34" charset="0"/>
+              <a:buChar char="•"/>
+            </a:pPr>
+            <a:r>
+              <a:rPr lang="en-US" dirty="0" smtClean="0"/>
+              <a:t>Your company is not a precious little snowflake.</a:t>
             </a:r>
             <a:endParaRPr lang="en-US" dirty="0"/>
           </a:p>
@@ -3720,7 +3692,7 @@
           <a:p>
             <a:fld id="{94CE3395-F8FF-4336-B2AA-E15575B990E7}" type="slidenum">
               <a:rPr lang="en-US" smtClean="0"/>
-              <a:t>35</a:t>
+              <a:t>34</a:t>
             </a:fld>
             <a:endParaRPr lang="en-US" dirty="0"/>
           </a:p>
@@ -3729,7 +3701,7 @@
     </p:spTree>
     <p:extLst>
       <p:ext uri="{BB962C8B-B14F-4D97-AF65-F5344CB8AC3E}">
-        <p14:creationId xmlns:p14="http://schemas.microsoft.com/office/powerpoint/2010/main" val="1880988075"/>
+        <p14:creationId xmlns:p14="http://schemas.microsoft.com/office/powerpoint/2010/main" val="1813778683"/>
       </p:ext>
     </p:extLst>
   </p:cSld>
@@ -3783,34 +3755,43 @@
           <a:bodyPr/>
           <a:lstStyle/>
           <a:p>
-            <a:pPr marL="0" marR="0" indent="0" algn="l" defTabSz="914400" rtl="0" eaLnBrk="1" fontAlgn="auto" latinLnBrk="0" hangingPunct="1">
-              <a:lnSpc>
-                <a:spcPct val="100000"/>
-              </a:lnSpc>
-              <a:spcBef>
-                <a:spcPts val="0"/>
-              </a:spcBef>
-              <a:spcAft>
-                <a:spcPts val="0"/>
-              </a:spcAft>
-              <a:buClrTx/>
-              <a:buSzTx/>
-              <a:buFontTx/>
-              <a:buNone/>
-              <a:tabLst/>
-              <a:defRPr/>
-            </a:pPr>
-            <a:r>
-              <a:rPr lang="en-US" smtClean="0"/>
-              <a:t>Not an</a:t>
-            </a:r>
-            <a:r>
-              <a:rPr lang="en-US" baseline="0" smtClean="0"/>
-              <a:t> ideal solution for a multi-core server.</a:t>
-            </a:r>
-            <a:endParaRPr lang="en-US" smtClean="0"/>
-          </a:p>
-          <a:p>
+            <a:r>
+              <a:rPr lang="en-US" baseline="0" dirty="0" smtClean="0"/>
+              <a:t>Code on my blog will track </a:t>
+            </a:r>
+            <a:r>
+              <a:rPr lang="en-US" baseline="0" dirty="0" err="1" smtClean="0"/>
+              <a:t>async</a:t>
+            </a:r>
+            <a:r>
+              <a:rPr lang="en-US" baseline="0" dirty="0" smtClean="0"/>
+              <a:t>/sync tasks executing outside the request context and notify ASP.NET that they’re running. Also publishes a </a:t>
+            </a:r>
+            <a:r>
+              <a:rPr lang="en-US" baseline="0" dirty="0" err="1" smtClean="0"/>
+              <a:t>CancellationToken</a:t>
+            </a:r>
+            <a:r>
+              <a:rPr lang="en-US" baseline="0" dirty="0" smtClean="0"/>
+              <a:t> which is set when ASP.NET has requested the </a:t>
+            </a:r>
+            <a:r>
+              <a:rPr lang="en-US" baseline="0" dirty="0" err="1" smtClean="0"/>
+              <a:t>AppDomain</a:t>
+            </a:r>
+            <a:r>
+              <a:rPr lang="en-US" baseline="0" dirty="0" smtClean="0"/>
+              <a:t> to exit.</a:t>
+            </a:r>
+          </a:p>
+          <a:p>
+            <a:endParaRPr lang="en-US" baseline="0" dirty="0" smtClean="0"/>
+          </a:p>
+          <a:p>
+            <a:r>
+              <a:rPr lang="en-US" baseline="0" dirty="0" smtClean="0"/>
+              <a:t>But don’t use this unless you are perfectly fine with the task never being executed!</a:t>
+            </a:r>
             <a:endParaRPr lang="en-US" dirty="0"/>
           </a:p>
         </p:txBody>
@@ -3832,7 +3813,7 @@
           <a:p>
             <a:fld id="{94CE3395-F8FF-4336-B2AA-E15575B990E7}" type="slidenum">
               <a:rPr lang="en-US" smtClean="0"/>
-              <a:t>36</a:t>
+              <a:t>35</a:t>
             </a:fld>
             <a:endParaRPr lang="en-US" dirty="0"/>
           </a:p>
@@ -3841,7 +3822,7 @@
     </p:spTree>
     <p:extLst>
       <p:ext uri="{BB962C8B-B14F-4D97-AF65-F5344CB8AC3E}">
-        <p14:creationId xmlns:p14="http://schemas.microsoft.com/office/powerpoint/2010/main" val="39393251"/>
+        <p14:creationId xmlns:p14="http://schemas.microsoft.com/office/powerpoint/2010/main" val="1880988075"/>
       </p:ext>
     </p:extLst>
   </p:cSld>
@@ -3895,22 +3876,34 @@
           <a:bodyPr/>
           <a:lstStyle/>
           <a:p>
-            <a:r>
-              <a:rPr lang="en-US" dirty="0" smtClean="0"/>
-              <a:t>Existing frameworks (and</a:t>
-            </a:r>
-            <a:r>
-              <a:rPr lang="en-US" baseline="0" dirty="0" smtClean="0"/>
-              <a:t> libraries) have very strong backwards-compatibility requirements that can make new features like </a:t>
-            </a:r>
-            <a:r>
-              <a:rPr lang="en-US" baseline="0" dirty="0" err="1" smtClean="0"/>
-              <a:t>async</a:t>
-            </a:r>
-            <a:r>
-              <a:rPr lang="en-US" baseline="0" dirty="0" smtClean="0"/>
-              <a:t>/await a bit awkward or unusable in some scenarios.</a:t>
-            </a:r>
+            <a:pPr marL="0" marR="0" indent="0" algn="l" defTabSz="914400" rtl="0" eaLnBrk="1" fontAlgn="auto" latinLnBrk="0" hangingPunct="1">
+              <a:lnSpc>
+                <a:spcPct val="100000"/>
+              </a:lnSpc>
+              <a:spcBef>
+                <a:spcPts val="0"/>
+              </a:spcBef>
+              <a:spcAft>
+                <a:spcPts val="0"/>
+              </a:spcAft>
+              <a:buClrTx/>
+              <a:buSzTx/>
+              <a:buFontTx/>
+              <a:buNone/>
+              <a:tabLst/>
+              <a:defRPr/>
+            </a:pPr>
+            <a:r>
+              <a:rPr lang="en-US" smtClean="0"/>
+              <a:t>Not an</a:t>
+            </a:r>
+            <a:r>
+              <a:rPr lang="en-US" baseline="0" smtClean="0"/>
+              <a:t> ideal solution for a multi-core server.</a:t>
+            </a:r>
+            <a:endParaRPr lang="en-US" smtClean="0"/>
+          </a:p>
+          <a:p>
             <a:endParaRPr lang="en-US" dirty="0"/>
           </a:p>
         </p:txBody>
@@ -3932,7 +3925,7 @@
           <a:p>
             <a:fld id="{94CE3395-F8FF-4336-B2AA-E15575B990E7}" type="slidenum">
               <a:rPr lang="en-US" smtClean="0"/>
-              <a:t>37</a:t>
+              <a:t>36</a:t>
             </a:fld>
             <a:endParaRPr lang="en-US" dirty="0"/>
           </a:p>
@@ -3941,7 +3934,7 @@
     </p:spTree>
     <p:extLst>
       <p:ext uri="{BB962C8B-B14F-4D97-AF65-F5344CB8AC3E}">
-        <p14:creationId xmlns:p14="http://schemas.microsoft.com/office/powerpoint/2010/main" val="4183552117"/>
+        <p14:creationId xmlns:p14="http://schemas.microsoft.com/office/powerpoint/2010/main" val="39393251"/>
       </p:ext>
     </p:extLst>
   </p:cSld>
@@ -3995,6 +3988,106 @@
           <a:bodyPr/>
           <a:lstStyle/>
           <a:p>
+            <a:r>
+              <a:rPr lang="en-US" dirty="0" smtClean="0"/>
+              <a:t>Existing frameworks (and</a:t>
+            </a:r>
+            <a:r>
+              <a:rPr lang="en-US" baseline="0" dirty="0" smtClean="0"/>
+              <a:t> libraries) have very strong backwards-compatibility requirements that can make new features like </a:t>
+            </a:r>
+            <a:r>
+              <a:rPr lang="en-US" baseline="0" dirty="0" err="1" smtClean="0"/>
+              <a:t>async</a:t>
+            </a:r>
+            <a:r>
+              <a:rPr lang="en-US" baseline="0" dirty="0" smtClean="0"/>
+              <a:t>/await a bit awkward or unusable in some scenarios.</a:t>
+            </a:r>
+            <a:endParaRPr lang="en-US" dirty="0"/>
+          </a:p>
+        </p:txBody>
+      </p:sp>
+      <p:sp>
+        <p:nvSpPr>
+          <p:cNvPr id="4" name="Slide Number Placeholder 3"/>
+          <p:cNvSpPr>
+            <a:spLocks noGrp="1"/>
+          </p:cNvSpPr>
+          <p:nvPr>
+            <p:ph type="sldNum" sz="quarter" idx="10"/>
+          </p:nvPr>
+        </p:nvSpPr>
+        <p:spPr/>
+        <p:txBody>
+          <a:bodyPr/>
+          <a:lstStyle/>
+          <a:p>
+            <a:fld id="{94CE3395-F8FF-4336-B2AA-E15575B990E7}" type="slidenum">
+              <a:rPr lang="en-US" smtClean="0"/>
+              <a:t>37</a:t>
+            </a:fld>
+            <a:endParaRPr lang="en-US" dirty="0"/>
+          </a:p>
+        </p:txBody>
+      </p:sp>
+    </p:spTree>
+    <p:extLst>
+      <p:ext uri="{BB962C8B-B14F-4D97-AF65-F5344CB8AC3E}">
+        <p14:creationId xmlns:p14="http://schemas.microsoft.com/office/powerpoint/2010/main" val="4183552117"/>
+      </p:ext>
+    </p:extLst>
+  </p:cSld>
+  <p:clrMapOvr>
+    <a:masterClrMapping/>
+  </p:clrMapOvr>
+</p:notes>
+</file>
+
+<file path=ppt/notesSlides/notesSlide34.xml><?xml version="1.0" encoding="utf-8"?>
+<p:notes xmlns:a="http://schemas.openxmlformats.org/drawingml/2006/main" xmlns:r="http://schemas.openxmlformats.org/officeDocument/2006/relationships" xmlns:p="http://schemas.openxmlformats.org/presentationml/2006/main">
+  <p:cSld>
+    <p:spTree>
+      <p:nvGrpSpPr>
+        <p:cNvPr id="1" name=""/>
+        <p:cNvGrpSpPr/>
+        <p:nvPr/>
+      </p:nvGrpSpPr>
+      <p:grpSpPr>
+        <a:xfrm>
+          <a:off x="0" y="0"/>
+          <a:ext cx="0" cy="0"/>
+          <a:chOff x="0" y="0"/>
+          <a:chExt cx="0" cy="0"/>
+        </a:xfrm>
+      </p:grpSpPr>
+      <p:sp>
+        <p:nvSpPr>
+          <p:cNvPr id="2" name="Slide Image Placeholder 1"/>
+          <p:cNvSpPr>
+            <a:spLocks noGrp="1" noRot="1" noChangeAspect="1"/>
+          </p:cNvSpPr>
+          <p:nvPr>
+            <p:ph type="sldImg"/>
+          </p:nvPr>
+        </p:nvSpPr>
+        <p:spPr/>
+      </p:sp>
+      <p:sp>
+        <p:nvSpPr>
+          <p:cNvPr id="3" name="Notes Placeholder 2"/>
+          <p:cNvSpPr>
+            <a:spLocks noGrp="1"/>
+          </p:cNvSpPr>
+          <p:nvPr>
+            <p:ph type="body" idx="1"/>
+          </p:nvPr>
+        </p:nvSpPr>
+        <p:spPr/>
+        <p:txBody>
+          <a:bodyPr/>
+          <a:lstStyle/>
+          <a:p>
             <a:pPr marL="0" marR="0" indent="0" algn="l" defTabSz="914400" rtl="0" eaLnBrk="1" fontAlgn="auto" latinLnBrk="0" hangingPunct="1">
               <a:lnSpc>
                 <a:spcPct val="100000"/>
@@ -4052,7 +4145,7 @@
 </p:notes>
 </file>
 
-<file path=ppt/notesSlides/notesSlide34.xml><?xml version="1.0" encoding="utf-8"?>
+<file path=ppt/notesSlides/notesSlide35.xml><?xml version="1.0" encoding="utf-8"?>
 <p:notes xmlns:a="http://schemas.openxmlformats.org/drawingml/2006/main" xmlns:r="http://schemas.openxmlformats.org/officeDocument/2006/relationships" xmlns:p="http://schemas.openxmlformats.org/presentationml/2006/main">
   <p:cSld>
     <p:spTree>
@@ -13253,11 +13346,7 @@
           <a:p>
             <a:r>
               <a:rPr lang="en-US" dirty="0" smtClean="0"/>
-              <a:t>Intro </a:t>
-            </a:r>
-            <a:r>
-              <a:rPr lang="en-US" dirty="0" smtClean="0"/>
-              <a:t>to </a:t>
+              <a:t>Intro to </a:t>
             </a:r>
             <a:r>
               <a:rPr lang="en-US" dirty="0" err="1" smtClean="0"/>
@@ -13265,15 +13354,7 @@
             </a:r>
             <a:r>
               <a:rPr lang="en-US" dirty="0" smtClean="0"/>
-              <a:t> </a:t>
-            </a:r>
-            <a:r>
-              <a:rPr lang="en-US" dirty="0" smtClean="0"/>
-              <a:t>on </a:t>
-            </a:r>
-            <a:r>
-              <a:rPr lang="en-US" dirty="0" smtClean="0"/>
-              <a:t>ASP.NET</a:t>
+              <a:t> on ASP.NET</a:t>
             </a:r>
             <a:endParaRPr lang="en-US" dirty="0"/>
           </a:p>
@@ -21264,11 +21345,7 @@
             </a:r>
             <a:r>
               <a:rPr lang="en-US" dirty="0" smtClean="0"/>
-              <a:t> directly</a:t>
-            </a:r>
-            <a:r>
-              <a:rPr lang="en-US" dirty="0" smtClean="0"/>
-              <a:t>.</a:t>
+              <a:t> directly.</a:t>
             </a:r>
             <a:endParaRPr lang="en-US" dirty="0"/>
           </a:p>
@@ -24999,10 +25076,9 @@
               <a:t>PageAsyncTask</a:t>
             </a:r>
             <a:r>
-              <a:rPr lang="en-US" smtClean="0"/>
+              <a:rPr lang="en-US" dirty="0" smtClean="0"/>
               <a:t> delegate.</a:t>
             </a:r>
-            <a:endParaRPr lang="en-US" dirty="0" smtClean="0"/>
           </a:p>
           <a:p>
             <a:pPr marL="796926" lvl="1" indent="-457200">

</xml_diff>

<commit_message>
Updates for MIGANG 2015.
</commit_message>
<xml_diff>
--- a/Async Servers/Intro to Async ASP.NET - 16.9.pptx
+++ b/Async Servers/Intro to Async ASP.NET - 16.9.pptx
@@ -292,7 +292,7 @@
           <a:p>
             <a:fld id="{574E8BCA-0B4F-4373-B78E-3D2899449797}" type="datetimeFigureOut">
               <a:rPr lang="en-US" smtClean="0"/>
-              <a:t>5/13/2014</a:t>
+              <a:t>8/19/2015</a:t>
             </a:fld>
             <a:endParaRPr lang="en-US" dirty="0"/>
           </a:p>
@@ -697,30 +697,12 @@
               <a:buChar char="•"/>
             </a:pPr>
             <a:r>
-              <a:rPr lang="en-US" dirty="0" smtClean="0"/>
-              <a:t>Current stable node.js version (0.10.23) uses V8</a:t>
-            </a:r>
-            <a:r>
               <a:rPr lang="en-US" baseline="0" dirty="0" smtClean="0"/>
-              <a:t> 3.14.5.9 with a few </a:t>
-            </a:r>
-            <a:r>
-              <a:rPr lang="en-US" baseline="0" dirty="0" err="1" smtClean="0"/>
-              <a:t>backported</a:t>
+              <a:t>Except </a:t>
             </a:r>
             <a:r>
               <a:rPr lang="en-US" baseline="0" dirty="0" smtClean="0"/>
-              <a:t> patches.</a:t>
-            </a:r>
-          </a:p>
-          <a:p>
-            <a:pPr marL="171450" indent="-171450">
-              <a:buFont typeface="Arial" panose="020B0604020202020204" pitchFamily="34" charset="0"/>
-              <a:buChar char="•"/>
-            </a:pPr>
-            <a:r>
-              <a:rPr lang="en-US" baseline="0" dirty="0" smtClean="0"/>
-              <a:t>Except for these differences, </a:t>
+              <a:t>for these differences, </a:t>
             </a:r>
             <a:r>
               <a:rPr lang="en-US" baseline="0" dirty="0" err="1" smtClean="0"/>
@@ -3296,16 +3278,61 @@
               <a:defRPr/>
             </a:pPr>
             <a:r>
-              <a:rPr lang="en-US" smtClean="0"/>
+              <a:rPr lang="en-US" dirty="0" smtClean="0"/>
               <a:t>EAP</a:t>
             </a:r>
             <a:r>
-              <a:rPr lang="en-US" baseline="0" smtClean="0"/>
-              <a:t> </a:t>
-            </a:r>
-            <a:r>
               <a:rPr lang="en-US" baseline="0" dirty="0" smtClean="0"/>
-              <a:t>works fine on ASP.NET if the handler is asynchronous.</a:t>
+              <a:t> works fine on ASP.NET if the handler is asynchronous</a:t>
+            </a:r>
+            <a:r>
+              <a:rPr lang="en-US" baseline="0" dirty="0" smtClean="0"/>
+              <a:t>.</a:t>
+            </a:r>
+          </a:p>
+          <a:p>
+            <a:pPr marL="171450" marR="0" indent="-171450" algn="l" defTabSz="914400" rtl="0" eaLnBrk="1" fontAlgn="auto" latinLnBrk="0" hangingPunct="1">
+              <a:lnSpc>
+                <a:spcPct val="100000"/>
+              </a:lnSpc>
+              <a:spcBef>
+                <a:spcPts val="0"/>
+              </a:spcBef>
+              <a:spcAft>
+                <a:spcPts val="0"/>
+              </a:spcAft>
+              <a:buClrTx/>
+              <a:buSzTx/>
+              <a:buFont typeface="Arial" panose="020B0604020202020204" pitchFamily="34" charset="0"/>
+              <a:buChar char="•"/>
+              <a:tabLst/>
+              <a:defRPr/>
+            </a:pPr>
+            <a:r>
+              <a:rPr lang="en-US" baseline="0" dirty="0" smtClean="0"/>
+              <a:t>ASP.NET </a:t>
+            </a:r>
+            <a:r>
+              <a:rPr lang="en-US" baseline="0" dirty="0" err="1" smtClean="0"/>
+              <a:t>vNext</a:t>
+            </a:r>
+            <a:r>
+              <a:rPr lang="en-US" baseline="0" dirty="0" smtClean="0"/>
+              <a:t> does not have a </a:t>
+            </a:r>
+            <a:r>
+              <a:rPr lang="en-US" baseline="0" dirty="0" err="1" smtClean="0"/>
+              <a:t>SynchronizationContext</a:t>
+            </a:r>
+            <a:r>
+              <a:rPr lang="en-US" baseline="0" dirty="0" smtClean="0"/>
+              <a:t> at all. </a:t>
+            </a:r>
+            <a:r>
+              <a:rPr lang="en-US" baseline="0" dirty="0" smtClean="0">
+                <a:sym typeface="Wingdings" panose="05000000000000000000" pitchFamily="2" charset="2"/>
+              </a:rPr>
+              <a:t></a:t>
             </a:r>
             <a:endParaRPr lang="en-US" dirty="0" smtClean="0"/>
           </a:p>
@@ -3396,21 +3423,18 @@
               <a:buChar char="•"/>
             </a:pPr>
             <a:r>
-              <a:rPr lang="en-US" dirty="0" smtClean="0"/>
-              <a:t>Logical Get/Set Data is </a:t>
-            </a:r>
-            <a:r>
               <a:rPr lang="en-US" baseline="0" dirty="0" smtClean="0"/>
-              <a:t>more portable than Items </a:t>
-            </a:r>
-            <a:r>
-              <a:rPr lang="en-US" i="1" baseline="0" dirty="0" smtClean="0"/>
-              <a:t>and</a:t>
+              <a:t>Items is not portable; will be going away in ASP.NET </a:t>
+            </a:r>
+            <a:r>
+              <a:rPr lang="en-US" baseline="0" dirty="0" err="1" smtClean="0"/>
+              <a:t>vNext</a:t>
             </a:r>
             <a:r>
               <a:rPr lang="en-US" baseline="0" dirty="0" smtClean="0"/>
-              <a:t> flows outside the request context.</a:t>
-            </a:r>
+              <a:t>.</a:t>
+            </a:r>
+            <a:endParaRPr lang="en-US" baseline="0" dirty="0" smtClean="0"/>
           </a:p>
           <a:p>
             <a:pPr marL="171450" indent="-171450">
@@ -3418,8 +3442,12 @@
               <a:buChar char="•"/>
             </a:pPr>
             <a:r>
+              <a:rPr lang="en-US" baseline="0" dirty="0" err="1" smtClean="0"/>
+              <a:t>AsyncLocal</a:t>
+            </a:r>
+            <a:r>
               <a:rPr lang="en-US" baseline="0" dirty="0" smtClean="0"/>
-              <a:t>However, you should only store immutable data there. </a:t>
+              <a:t> and logical call context should only store immutable data. </a:t>
             </a:r>
             <a:r>
               <a:rPr lang="en-US" baseline="0" dirty="0" err="1" smtClean="0"/>
@@ -3757,7 +3785,19 @@
           <a:p>
             <a:r>
               <a:rPr lang="en-US" baseline="0" dirty="0" smtClean="0"/>
-              <a:t>Code on my blog will track </a:t>
+              <a:t>The “just ok” </a:t>
+            </a:r>
+            <a:r>
+              <a:rPr lang="en-US" baseline="0" dirty="0" err="1" smtClean="0"/>
+              <a:t>soltuions</a:t>
+            </a:r>
+            <a:r>
+              <a:rPr lang="en-US" baseline="0" dirty="0" smtClean="0"/>
+              <a:t> </a:t>
+            </a:r>
+            <a:r>
+              <a:rPr lang="en-US" baseline="0" dirty="0" smtClean="0"/>
+              <a:t>will track </a:t>
             </a:r>
             <a:r>
               <a:rPr lang="en-US" baseline="0" dirty="0" err="1" smtClean="0"/>
@@ -13318,12 +13358,8 @@
           <a:lstStyle/>
           <a:p>
             <a:r>
-              <a:rPr lang="en-US" dirty="0" err="1" smtClean="0"/>
-              <a:t>GRDevDay</a:t>
-            </a:r>
-            <a:r>
-              <a:rPr lang="en-US" dirty="0" smtClean="0"/>
-              <a:t> 2014</a:t>
+              <a:rPr lang="en-US" dirty="0" smtClean="0"/>
+              <a:t>MIGANG 2015</a:t>
             </a:r>
             <a:endParaRPr lang="en-US" dirty="0"/>
           </a:p>
@@ -13610,7 +13646,7 @@
 </file>
 
 <file path=ppt/slides/slide11.xml><?xml version="1.0" encoding="utf-8"?>
-<p:sld xmlns:a="http://schemas.openxmlformats.org/drawingml/2006/main" xmlns:r="http://schemas.openxmlformats.org/officeDocument/2006/relationships" xmlns:p="http://schemas.openxmlformats.org/presentationml/2006/main" show="0">
+<p:sld xmlns:a="http://schemas.openxmlformats.org/drawingml/2006/main" xmlns:r="http://schemas.openxmlformats.org/officeDocument/2006/relationships" xmlns:p="http://schemas.openxmlformats.org/presentationml/2006/main">
   <p:cSld>
     <p:spTree>
       <p:nvGrpSpPr>
@@ -14250,7 +14286,7 @@
         <p:spPr>
           <a:xfrm>
             <a:off x="269239" y="1197322"/>
-            <a:ext cx="11653522" cy="4930709"/>
+            <a:ext cx="11653522" cy="4665188"/>
           </a:xfrm>
         </p:spPr>
         <p:txBody>
@@ -14350,36 +14386,39 @@
             </a:pPr>
             <a:r>
               <a:rPr lang="en-US" dirty="0" smtClean="0"/>
-              <a:t>ES6 introduces generators which will simplify </a:t>
-            </a:r>
-            <a:r>
-              <a:rPr lang="en-US" dirty="0" err="1" smtClean="0"/>
-              <a:t>async</a:t>
-            </a:r>
-            <a:r>
-              <a:rPr lang="en-US" dirty="0" smtClean="0"/>
-              <a:t> code.</a:t>
-            </a:r>
-          </a:p>
-          <a:p>
-            <a:pPr marL="1030290" lvl="2" indent="-457200">
+              <a:t>ES6 </a:t>
+            </a:r>
+            <a:r>
+              <a:rPr lang="en-US" dirty="0" smtClean="0"/>
+              <a:t>introduced </a:t>
+            </a:r>
+            <a:r>
+              <a:rPr lang="en-US" dirty="0" smtClean="0"/>
+              <a:t>generators which </a:t>
+            </a:r>
+            <a:r>
+              <a:rPr lang="en-US" dirty="0" smtClean="0"/>
+              <a:t>(with promises) is a step in the right direction.</a:t>
+            </a:r>
+          </a:p>
+          <a:p>
+            <a:pPr marL="796926" lvl="1" indent="-457200">
               <a:buFont typeface="Arial" panose="020B0604020202020204" pitchFamily="34" charset="0"/>
               <a:buChar char="•"/>
             </a:pPr>
             <a:r>
               <a:rPr lang="en-US" dirty="0" smtClean="0"/>
-              <a:t>Available (as of 2013-05-13) in V8 3.19 / Node.js 0.11.2 (Unstable)</a:t>
-            </a:r>
-          </a:p>
-          <a:p>
-            <a:pPr marL="1030290" lvl="2" indent="-457200">
-              <a:buFont typeface="Arial" panose="020B0604020202020204" pitchFamily="34" charset="0"/>
-              <a:buChar char="•"/>
-            </a:pPr>
-            <a:r>
-              <a:rPr lang="en-US" dirty="0" smtClean="0"/>
-              <a:t>Pass --harmony or --harmony-generators</a:t>
-            </a:r>
+              <a:t>ES7 will introduce </a:t>
+            </a:r>
+            <a:r>
+              <a:rPr lang="en-US" dirty="0" err="1" smtClean="0"/>
+              <a:t>async</a:t>
+            </a:r>
+            <a:r>
+              <a:rPr lang="en-US" dirty="0" smtClean="0"/>
+              <a:t>/await.</a:t>
+            </a:r>
+            <a:endParaRPr lang="en-US" dirty="0" smtClean="0"/>
           </a:p>
         </p:txBody>
       </p:sp>
@@ -21375,7 +21414,7 @@
 </file>
 
 <file path=ppt/slides/slide29.xml><?xml version="1.0" encoding="utf-8"?>
-<p:sld xmlns:a="http://schemas.openxmlformats.org/drawingml/2006/main" xmlns:r="http://schemas.openxmlformats.org/officeDocument/2006/relationships" xmlns:p="http://schemas.openxmlformats.org/presentationml/2006/main" show="0">
+<p:sld xmlns:a="http://schemas.openxmlformats.org/drawingml/2006/main" xmlns:r="http://schemas.openxmlformats.org/officeDocument/2006/relationships" xmlns:p="http://schemas.openxmlformats.org/presentationml/2006/main">
   <p:cSld>
     <p:spTree>
       <p:nvGrpSpPr>
@@ -21724,7 +21763,7 @@
 </file>
 
 <file path=ppt/slides/slide30.xml><?xml version="1.0" encoding="utf-8"?>
-<p:sld xmlns:a="http://schemas.openxmlformats.org/drawingml/2006/main" xmlns:r="http://schemas.openxmlformats.org/officeDocument/2006/relationships" xmlns:p="http://schemas.openxmlformats.org/presentationml/2006/main" show="0">
+<p:sld xmlns:a="http://schemas.openxmlformats.org/drawingml/2006/main" xmlns:r="http://schemas.openxmlformats.org/officeDocument/2006/relationships" xmlns:p="http://schemas.openxmlformats.org/presentationml/2006/main">
   <p:cSld>
     <p:spTree>
       <p:nvGrpSpPr>
@@ -23131,10 +23170,18 @@
               <a:buChar char="•"/>
             </a:pPr>
             <a:r>
-              <a:rPr lang="en-US" dirty="0" err="1" smtClean="0"/>
-              <a:t>HttpContext.Current.Items</a:t>
-            </a:r>
-            <a:endParaRPr lang="en-US" dirty="0" smtClean="0"/>
+              <a:rPr lang="en-US" dirty="0" err="1"/>
+              <a:t>AsyncLocal</a:t>
+            </a:r>
+            <a:r>
+              <a:rPr lang="en-US" dirty="0"/>
+              <a:t>&lt;T</a:t>
+            </a:r>
+            <a:r>
+              <a:rPr lang="en-US" dirty="0" smtClean="0"/>
+              <a:t>&gt; (.NET 4.6)</a:t>
+            </a:r>
+            <a:endParaRPr lang="en-US" dirty="0"/>
           </a:p>
           <a:p>
             <a:pPr marL="796926" lvl="1" indent="-457200">
@@ -23143,11 +23190,11 @@
             </a:pPr>
             <a:r>
               <a:rPr lang="en-US" dirty="0" err="1" smtClean="0"/>
-              <a:t>AsyncLocal</a:t>
-            </a:r>
-            <a:r>
-              <a:rPr lang="en-US" dirty="0" smtClean="0"/>
-              <a:t>&lt;T&gt; (not yet available)</a:t>
+              <a:t>HttpContext.Current.Items</a:t>
+            </a:r>
+            <a:r>
+              <a:rPr lang="en-US" dirty="0" smtClean="0"/>
+              <a:t> (if you must)</a:t>
             </a:r>
           </a:p>
           <a:p>
@@ -23169,7 +23216,15 @@
             </a:r>
             <a:r>
               <a:rPr lang="en-US" dirty="0" smtClean="0"/>
-              <a:t>]Data (if you must)</a:t>
+              <a:t>]Data (</a:t>
+            </a:r>
+            <a:r>
+              <a:rPr lang="en-US" dirty="0" smtClean="0"/>
+              <a:t>.NET 4.5</a:t>
+            </a:r>
+            <a:r>
+              <a:rPr lang="en-US" dirty="0" smtClean="0"/>
+              <a:t>)</a:t>
             </a:r>
             <a:endParaRPr lang="en-US" dirty="0"/>
           </a:p>
@@ -23487,19 +23542,20 @@
         <p:spPr>
           <a:xfrm>
             <a:off x="269239" y="1197322"/>
-            <a:ext cx="11653522" cy="5212837"/>
+            <a:ext cx="11653522" cy="4914038"/>
           </a:xfrm>
         </p:spPr>
         <p:txBody>
           <a:bodyPr/>
           <a:lstStyle/>
           <a:p>
-            <a:endParaRPr lang="en-US" dirty="0" smtClean="0"/>
-          </a:p>
-          <a:p>
-            <a:r>
-              <a:rPr lang="en-US" dirty="0" smtClean="0"/>
-              <a:t>Correct solution:</a:t>
+            <a:r>
+              <a:rPr lang="en-US" dirty="0" smtClean="0"/>
+              <a:t>Correct </a:t>
+            </a:r>
+            <a:r>
+              <a:rPr lang="en-US" dirty="0" smtClean="0"/>
+              <a:t>solution:</a:t>
             </a:r>
           </a:p>
           <a:p>
@@ -23614,24 +23670,43 @@
           <a:p>
             <a:r>
               <a:rPr lang="en-US" dirty="0" smtClean="0"/>
-              <a:t>But if </a:t>
-            </a:r>
-            <a:r>
-              <a:rPr lang="en-US" dirty="0"/>
-              <a:t>you must</a:t>
-            </a:r>
-            <a:r>
-              <a:rPr lang="en-US" dirty="0" smtClean="0"/>
-              <a:t>:</a:t>
-            </a:r>
-          </a:p>
-          <a:p>
-            <a:pPr lvl="1"/>
-            <a:r>
-              <a:rPr lang="en-US" dirty="0">
-                <a:hlinkClick r:id="rId3"/>
-              </a:rPr>
-              <a:t>http://blog.stephencleary.com/2012/12/returning-early-from-aspnet-requests.html</a:t>
+              <a:t>But if you must:</a:t>
+            </a:r>
+          </a:p>
+          <a:p>
+            <a:pPr marL="796926" lvl="1" indent="-457200">
+              <a:buFont typeface="Arial" panose="020B0604020202020204" pitchFamily="34" charset="0"/>
+              <a:buChar char="•"/>
+            </a:pPr>
+            <a:r>
+              <a:rPr lang="en-US" dirty="0" err="1" smtClean="0"/>
+              <a:t>HostingEnvironment.QueueBackgroundWorkItem</a:t>
+            </a:r>
+            <a:r>
+              <a:rPr lang="en-US" dirty="0" smtClean="0"/>
+              <a:t> (.NET 4.5.1)</a:t>
+            </a:r>
+          </a:p>
+          <a:p>
+            <a:pPr marL="796926" lvl="1" indent="-457200">
+              <a:buFont typeface="Arial" panose="020B0604020202020204" pitchFamily="34" charset="0"/>
+              <a:buChar char="•"/>
+            </a:pPr>
+            <a:r>
+              <a:rPr lang="en-US" dirty="0" err="1" smtClean="0"/>
+              <a:t>AspNetBackgroundTasks</a:t>
+            </a:r>
+            <a:r>
+              <a:rPr lang="en-US" dirty="0" smtClean="0"/>
+              <a:t> (</a:t>
+            </a:r>
+            <a:r>
+              <a:rPr lang="en-US" dirty="0" err="1" smtClean="0"/>
+              <a:t>Nuget</a:t>
+            </a:r>
+            <a:r>
+              <a:rPr lang="en-US" dirty="0" smtClean="0"/>
+              <a:t>)</a:t>
             </a:r>
             <a:endParaRPr lang="en-US" dirty="0" smtClean="0"/>
           </a:p>
@@ -23646,7 +23721,7 @@
           <p:nvPr/>
         </p:nvPicPr>
         <p:blipFill>
-          <a:blip r:embed="rId4">
+          <a:blip r:embed="rId3">
             <a:extLst>
               <a:ext uri="{28A0092B-C50C-407E-A947-70E740481C1C}">
                 <a14:useLocalDpi xmlns:a14="http://schemas.microsoft.com/office/drawing/2010/main" val="0"/>
@@ -25113,7 +25188,7 @@
 </file>
 
 <file path=ppt/slides/slide42.xml><?xml version="1.0" encoding="utf-8"?>
-<p:sld xmlns:a="http://schemas.openxmlformats.org/drawingml/2006/main" xmlns:r="http://schemas.openxmlformats.org/officeDocument/2006/relationships" xmlns:p="http://schemas.openxmlformats.org/presentationml/2006/main" show="0">
+<p:sld xmlns:a="http://schemas.openxmlformats.org/drawingml/2006/main" xmlns:r="http://schemas.openxmlformats.org/officeDocument/2006/relationships" xmlns:p="http://schemas.openxmlformats.org/presentationml/2006/main">
   <p:cSld>
     <p:spTree>
       <p:nvGrpSpPr>
@@ -30612,468 +30687,1016 @@
           </a:p>
         </p:txBody>
       </p:sp>
-      <p:grpSp>
-        <p:nvGrpSpPr>
-          <p:cNvPr id="16" name="Group 15"/>
-          <p:cNvGrpSpPr/>
+      <p:sp>
+        <p:nvSpPr>
+          <p:cNvPr id="18" name="Oval 17"/>
+          <p:cNvSpPr/>
           <p:nvPr/>
-        </p:nvGrpSpPr>
-        <p:grpSpPr>
+        </p:nvSpPr>
+        <p:spPr bwMode="auto">
           <a:xfrm>
             <a:off x="1836576" y="1268964"/>
             <a:ext cx="8518849" cy="4993934"/>
-            <a:chOff x="1836576" y="1268964"/>
-            <a:chExt cx="8518849" cy="4993934"/>
           </a:xfrm>
-        </p:grpSpPr>
-        <p:sp>
-          <p:nvSpPr>
-            <p:cNvPr id="8" name="Oval 7"/>
-            <p:cNvSpPr/>
-            <p:nvPr/>
-          </p:nvSpPr>
-          <p:spPr bwMode="auto">
-            <a:xfrm>
-              <a:off x="1836576" y="1268964"/>
-              <a:ext cx="8518849" cy="4993934"/>
-            </a:xfrm>
-            <a:prstGeom prst="ellipse">
+          <a:prstGeom prst="ellipse">
+            <a:avLst/>
+          </a:prstGeom>
+          <a:noFill/>
+          <a:ln w="38100">
+            <a:solidFill>
+              <a:schemeClr val="accent1"/>
+            </a:solidFill>
+            <a:headEnd type="none" w="med" len="med"/>
+            <a:tailEnd type="none" w="med" len="med"/>
+          </a:ln>
+        </p:spPr>
+        <p:style>
+          <a:lnRef idx="2">
+            <a:schemeClr val="accent1">
+              <a:shade val="50000"/>
+            </a:schemeClr>
+          </a:lnRef>
+          <a:fillRef idx="1">
+            <a:schemeClr val="accent1"/>
+          </a:fillRef>
+          <a:effectRef idx="0">
+            <a:schemeClr val="accent1"/>
+          </a:effectRef>
+          <a:fontRef idx="minor">
+            <a:schemeClr val="lt1"/>
+          </a:fontRef>
+        </p:style>
+        <p:txBody>
+          <a:bodyPr vert="horz" wrap="square" lIns="0" tIns="0" rIns="0" bIns="0" numCol="1" rtlCol="0" anchor="t" anchorCtr="1" compatLnSpc="1">
+            <a:prstTxWarp prst="textNoShape">
               <a:avLst/>
-            </a:prstGeom>
+            </a:prstTxWarp>
+          </a:bodyPr>
+          <a:lstStyle/>
+          <a:p>
+            <a:pPr algn="ctr" defTabSz="932472" fontAlgn="base">
+              <a:spcBef>
+                <a:spcPct val="0"/>
+              </a:spcBef>
+              <a:spcAft>
+                <a:spcPct val="0"/>
+              </a:spcAft>
+            </a:pPr>
+            <a:endParaRPr lang="en-US" sz="3200" dirty="0" smtClean="0">
+              <a:solidFill>
+                <a:schemeClr val="accent1"/>
+              </a:solidFill>
+            </a:endParaRPr>
+          </a:p>
+        </p:txBody>
+      </p:sp>
+      <p:sp>
+        <p:nvSpPr>
+          <p:cNvPr id="19" name="Oval 18"/>
+          <p:cNvSpPr/>
+          <p:nvPr/>
+        </p:nvSpPr>
+        <p:spPr>
+          <a:xfrm>
+            <a:off x="6336314" y="2510110"/>
+            <a:ext cx="3200400" cy="3200400"/>
+          </a:xfrm>
+          <a:prstGeom prst="ellipse">
+            <a:avLst/>
+          </a:prstGeom>
+          <a:noFill/>
+          <a:ln w="38100">
             <a:solidFill>
-              <a:schemeClr val="tx2"/>
+              <a:schemeClr val="accent1"/>
             </a:solidFill>
-            <a:ln>
-              <a:noFill/>
-              <a:headEnd type="none" w="med" len="med"/>
-              <a:tailEnd type="none" w="med" len="med"/>
-            </a:ln>
-          </p:spPr>
-          <p:style>
-            <a:lnRef idx="2">
-              <a:schemeClr val="accent1">
-                <a:shade val="50000"/>
-              </a:schemeClr>
-            </a:lnRef>
-            <a:fillRef idx="1">
-              <a:schemeClr val="accent1"/>
-            </a:fillRef>
-            <a:effectRef idx="0">
-              <a:schemeClr val="accent1"/>
-            </a:effectRef>
-            <a:fontRef idx="minor">
-              <a:schemeClr val="lt1"/>
-            </a:fontRef>
-          </p:style>
-          <p:txBody>
-            <a:bodyPr vert="horz" wrap="square" lIns="0" tIns="46637" rIns="0" bIns="46637" numCol="1" rtlCol="0" anchor="t" anchorCtr="0" compatLnSpc="1">
-              <a:prstTxWarp prst="textNoShape">
-                <a:avLst/>
-              </a:prstTxWarp>
-            </a:bodyPr>
-            <a:lstStyle/>
-            <a:p>
-              <a:pPr algn="ctr" defTabSz="932472" fontAlgn="base">
-                <a:spcBef>
-                  <a:spcPct val="0"/>
-                </a:spcBef>
-                <a:spcAft>
-                  <a:spcPct val="0"/>
-                </a:spcAft>
-              </a:pPr>
-              <a:r>
-                <a:rPr lang="en-US" sz="3200" dirty="0" smtClean="0">
-                  <a:solidFill>
-                    <a:schemeClr val="bg2"/>
-                  </a:solidFill>
-                </a:rPr>
-                <a:t>Concurrent</a:t>
-              </a:r>
-              <a:endParaRPr lang="en-US" sz="3200" dirty="0">
+            <a:prstDash val="solid"/>
+          </a:ln>
+        </p:spPr>
+        <p:style>
+          <a:lnRef idx="2">
+            <a:schemeClr val="lt1">
+              <a:hueOff val="0"/>
+              <a:satOff val="0"/>
+              <a:lumOff val="0"/>
+              <a:alphaOff val="0"/>
+            </a:schemeClr>
+          </a:lnRef>
+          <a:fillRef idx="1">
+            <a:scrgbClr r="0" g="0" b="0"/>
+          </a:fillRef>
+          <a:effectRef idx="0">
+            <a:schemeClr val="accent1">
+              <a:alpha val="50000"/>
+              <a:hueOff val="0"/>
+              <a:satOff val="0"/>
+              <a:lumOff val="0"/>
+              <a:alphaOff val="0"/>
+            </a:schemeClr>
+          </a:effectRef>
+          <a:fontRef idx="minor">
+            <a:schemeClr val="tx1"/>
+          </a:fontRef>
+        </p:style>
+      </p:sp>
+      <p:sp>
+        <p:nvSpPr>
+          <p:cNvPr id="20" name="Oval 4"/>
+          <p:cNvSpPr/>
+          <p:nvPr/>
+        </p:nvSpPr>
+        <p:spPr>
+          <a:xfrm>
+            <a:off x="6805001" y="2978798"/>
+            <a:ext cx="2263026" cy="2263025"/>
+          </a:xfrm>
+          <a:prstGeom prst="rect">
+            <a:avLst/>
+          </a:prstGeom>
+        </p:spPr>
+        <p:style>
+          <a:lnRef idx="0">
+            <a:scrgbClr r="0" g="0" b="0"/>
+          </a:lnRef>
+          <a:fillRef idx="0">
+            <a:scrgbClr r="0" g="0" b="0"/>
+          </a:fillRef>
+          <a:effectRef idx="0">
+            <a:scrgbClr r="0" g="0" b="0"/>
+          </a:effectRef>
+          <a:fontRef idx="minor">
+            <a:schemeClr val="tx1"/>
+          </a:fontRef>
+        </p:style>
+        <p:txBody>
+          <a:bodyPr spcFirstLastPara="0" vert="horz" wrap="square" lIns="93919" tIns="21590" rIns="93919" bIns="21590" numCol="1" spcCol="1270" anchor="t" anchorCtr="0">
+            <a:noAutofit/>
+          </a:bodyPr>
+          <a:lstStyle/>
+          <a:p>
+            <a:pPr lvl="0" algn="ctr" defTabSz="755650">
+              <a:lnSpc>
+                <a:spcPct val="90000"/>
+              </a:lnSpc>
+              <a:spcBef>
+                <a:spcPct val="0"/>
+              </a:spcBef>
+              <a:spcAft>
+                <a:spcPct val="35000"/>
+              </a:spcAft>
+            </a:pPr>
+            <a:r>
+              <a:rPr lang="en-US" sz="1700" kern="1200" dirty="0" smtClean="0">
                 <a:solidFill>
                   <a:schemeClr val="bg2"/>
                 </a:solidFill>
-              </a:endParaRPr>
-            </a:p>
-          </p:txBody>
-        </p:sp>
-        <p:grpSp>
-          <p:nvGrpSpPr>
-            <p:cNvPr id="7" name="Group 6"/>
-            <p:cNvGrpSpPr/>
-            <p:nvPr/>
-          </p:nvGrpSpPr>
-          <p:grpSpPr>
-            <a:xfrm>
-              <a:off x="2667226" y="2510110"/>
-              <a:ext cx="6869488" cy="3200400"/>
-              <a:chOff x="2667226" y="2510110"/>
-              <a:chExt cx="6869488" cy="3200400"/>
-            </a:xfrm>
-          </p:grpSpPr>
-          <p:grpSp>
-            <p:nvGrpSpPr>
-              <p:cNvPr id="5" name="Group 4"/>
-              <p:cNvGrpSpPr/>
-              <p:nvPr/>
-            </p:nvGrpSpPr>
-            <p:grpSpPr>
-              <a:xfrm>
-                <a:off x="2667226" y="2510110"/>
-                <a:ext cx="3200400" cy="3200400"/>
-                <a:chOff x="0" y="439322"/>
-                <a:chExt cx="2764610" cy="2782990"/>
-              </a:xfrm>
-            </p:grpSpPr>
-            <p:sp>
-              <p:nvSpPr>
-                <p:cNvPr id="6" name="Oval 5"/>
-                <p:cNvSpPr/>
-                <p:nvPr/>
-              </p:nvSpPr>
-              <p:spPr>
-                <a:xfrm>
-                  <a:off x="0" y="439322"/>
-                  <a:ext cx="2764610" cy="2782990"/>
-                </a:xfrm>
-                <a:prstGeom prst="ellipse">
-                  <a:avLst/>
-                </a:prstGeom>
-              </p:spPr>
-              <p:style>
-                <a:lnRef idx="2">
-                  <a:schemeClr val="lt1">
-                    <a:hueOff val="0"/>
-                    <a:satOff val="0"/>
-                    <a:lumOff val="0"/>
-                    <a:alphaOff val="0"/>
-                  </a:schemeClr>
-                </a:lnRef>
-                <a:fillRef idx="1">
-                  <a:schemeClr val="accent1">
-                    <a:alpha val="50000"/>
-                    <a:hueOff val="0"/>
-                    <a:satOff val="0"/>
-                    <a:lumOff val="0"/>
-                    <a:alphaOff val="0"/>
-                  </a:schemeClr>
-                </a:fillRef>
-                <a:effectRef idx="0">
-                  <a:schemeClr val="accent1">
-                    <a:alpha val="50000"/>
-                    <a:hueOff val="0"/>
-                    <a:satOff val="0"/>
-                    <a:lumOff val="0"/>
-                    <a:alphaOff val="0"/>
-                  </a:schemeClr>
-                </a:effectRef>
-                <a:fontRef idx="minor">
+              </a:rPr>
+              <a:t>Multithreaded</a:t>
+            </a:r>
+            <a:endParaRPr lang="en-US" sz="1700" kern="1200" dirty="0">
+              <a:solidFill>
+                <a:schemeClr val="bg2"/>
+              </a:solidFill>
+            </a:endParaRPr>
+          </a:p>
+        </p:txBody>
+      </p:sp>
+      <p:sp>
+        <p:nvSpPr>
+          <p:cNvPr id="21" name="Oval 20"/>
+          <p:cNvSpPr/>
+          <p:nvPr/>
+        </p:nvSpPr>
+        <p:spPr>
+          <a:xfrm>
+            <a:off x="2667226" y="2510110"/>
+            <a:ext cx="3200400" cy="3200400"/>
+          </a:xfrm>
+          <a:prstGeom prst="ellipse">
+            <a:avLst/>
+          </a:prstGeom>
+          <a:noFill/>
+          <a:ln w="38100">
+            <a:solidFill>
+              <a:schemeClr val="accent1"/>
+            </a:solidFill>
+            <a:prstDash val="solid"/>
+          </a:ln>
+        </p:spPr>
+        <p:style>
+          <a:lnRef idx="2">
+            <a:schemeClr val="lt1">
+              <a:hueOff val="0"/>
+              <a:satOff val="0"/>
+              <a:lumOff val="0"/>
+              <a:alphaOff val="0"/>
+            </a:schemeClr>
+          </a:lnRef>
+          <a:fillRef idx="1">
+            <a:schemeClr val="accent1">
+              <a:alpha val="50000"/>
+              <a:hueOff val="0"/>
+              <a:satOff val="0"/>
+              <a:lumOff val="0"/>
+              <a:alphaOff val="0"/>
+            </a:schemeClr>
+          </a:fillRef>
+          <a:effectRef idx="0">
+            <a:schemeClr val="accent1">
+              <a:alpha val="50000"/>
+              <a:hueOff val="0"/>
+              <a:satOff val="0"/>
+              <a:lumOff val="0"/>
+              <a:alphaOff val="0"/>
+            </a:schemeClr>
+          </a:effectRef>
+          <a:fontRef idx="minor">
+            <a:schemeClr val="tx1"/>
+          </a:fontRef>
+        </p:style>
+      </p:sp>
+      <p:sp>
+        <p:nvSpPr>
+          <p:cNvPr id="22" name="Oval 4"/>
+          <p:cNvSpPr/>
+          <p:nvPr/>
+        </p:nvSpPr>
+        <p:spPr>
+          <a:xfrm>
+            <a:off x="3135914" y="2978797"/>
+            <a:ext cx="2263024" cy="2263026"/>
+          </a:xfrm>
+          <a:prstGeom prst="rect">
+            <a:avLst/>
+          </a:prstGeom>
+        </p:spPr>
+        <p:style>
+          <a:lnRef idx="0">
+            <a:scrgbClr r="0" g="0" b="0"/>
+          </a:lnRef>
+          <a:fillRef idx="0">
+            <a:scrgbClr r="0" g="0" b="0"/>
+          </a:fillRef>
+          <a:effectRef idx="0">
+            <a:scrgbClr r="0" g="0" b="0"/>
+          </a:effectRef>
+          <a:fontRef idx="minor">
+            <a:schemeClr val="tx1"/>
+          </a:fontRef>
+        </p:style>
+        <p:txBody>
+          <a:bodyPr spcFirstLastPara="0" vert="horz" wrap="square" lIns="93919" tIns="21590" rIns="93919" bIns="21590" numCol="1" spcCol="1270" anchor="t" anchorCtr="0">
+            <a:noAutofit/>
+          </a:bodyPr>
+          <a:lstStyle/>
+          <a:p>
+            <a:pPr lvl="0" algn="ctr" defTabSz="755650">
+              <a:lnSpc>
+                <a:spcPct val="90000"/>
+              </a:lnSpc>
+              <a:spcBef>
+                <a:spcPct val="0"/>
+              </a:spcBef>
+              <a:spcAft>
+                <a:spcPct val="35000"/>
+              </a:spcAft>
+            </a:pPr>
+            <a:r>
+              <a:rPr lang="en-US" sz="1700" kern="1200" dirty="0" smtClean="0">
+                <a:solidFill>
+                  <a:schemeClr val="bg2"/>
+                </a:solidFill>
+              </a:rPr>
+              <a:t>Reactive</a:t>
+            </a:r>
+            <a:endParaRPr lang="en-US" sz="1700" kern="1200" dirty="0">
+              <a:solidFill>
+                <a:schemeClr val="bg2"/>
+              </a:solidFill>
+            </a:endParaRPr>
+          </a:p>
+        </p:txBody>
+      </p:sp>
+      <p:sp>
+        <p:nvSpPr>
+          <p:cNvPr id="23" name="Oval 22"/>
+          <p:cNvSpPr/>
+          <p:nvPr/>
+        </p:nvSpPr>
+        <p:spPr>
+          <a:xfrm>
+            <a:off x="2895572" y="3809347"/>
+            <a:ext cx="2743200" cy="1237607"/>
+          </a:xfrm>
+          <a:prstGeom prst="ellipse">
+            <a:avLst/>
+          </a:prstGeom>
+          <a:noFill/>
+          <a:ln w="38100">
+            <a:solidFill>
+              <a:schemeClr val="accent1"/>
+            </a:solidFill>
+            <a:prstDash val="solid"/>
+          </a:ln>
+        </p:spPr>
+        <p:style>
+          <a:lnRef idx="2">
+            <a:schemeClr val="lt1">
+              <a:hueOff val="0"/>
+              <a:satOff val="0"/>
+              <a:lumOff val="0"/>
+              <a:alphaOff val="0"/>
+            </a:schemeClr>
+          </a:lnRef>
+          <a:fillRef idx="1">
+            <a:scrgbClr r="0" g="0" b="0"/>
+          </a:fillRef>
+          <a:effectRef idx="0">
+            <a:schemeClr val="accent1">
+              <a:alpha val="50000"/>
+              <a:hueOff val="0"/>
+              <a:satOff val="0"/>
+              <a:lumOff val="0"/>
+              <a:alphaOff val="0"/>
+            </a:schemeClr>
+          </a:effectRef>
+          <a:fontRef idx="minor">
+            <a:schemeClr val="tx1"/>
+          </a:fontRef>
+        </p:style>
+      </p:sp>
+      <p:sp>
+        <p:nvSpPr>
+          <p:cNvPr id="24" name="Oval 4"/>
+          <p:cNvSpPr/>
+          <p:nvPr/>
+        </p:nvSpPr>
+        <p:spPr>
+          <a:xfrm>
+            <a:off x="3357195" y="4121373"/>
+            <a:ext cx="1819954" cy="613557"/>
+          </a:xfrm>
+          <a:prstGeom prst="rect">
+            <a:avLst/>
+          </a:prstGeom>
+        </p:spPr>
+        <p:style>
+          <a:lnRef idx="0">
+            <a:scrgbClr r="0" g="0" b="0"/>
+          </a:lnRef>
+          <a:fillRef idx="0">
+            <a:scrgbClr r="0" g="0" b="0"/>
+          </a:fillRef>
+          <a:effectRef idx="0">
+            <a:scrgbClr r="0" g="0" b="0"/>
+          </a:effectRef>
+          <a:fontRef idx="minor">
+            <a:schemeClr val="tx1"/>
+          </a:fontRef>
+        </p:style>
+        <p:txBody>
+          <a:bodyPr spcFirstLastPara="0" vert="horz" wrap="square" lIns="93919" tIns="21590" rIns="93919" bIns="21590" numCol="1" spcCol="1270" anchor="ctr" anchorCtr="0">
+            <a:noAutofit/>
+          </a:bodyPr>
+          <a:lstStyle/>
+          <a:p>
+            <a:pPr lvl="0" algn="ctr" defTabSz="755650">
+              <a:lnSpc>
+                <a:spcPct val="90000"/>
+              </a:lnSpc>
+              <a:spcBef>
+                <a:spcPct val="0"/>
+              </a:spcBef>
+              <a:spcAft>
+                <a:spcPct val="35000"/>
+              </a:spcAft>
+            </a:pPr>
+            <a:r>
+              <a:rPr lang="en-US" sz="1700" kern="1200" dirty="0" smtClean="0">
+                <a:solidFill>
+                  <a:schemeClr val="bg2"/>
+                </a:solidFill>
+              </a:rPr>
+              <a:t>Asynchronous</a:t>
+            </a:r>
+          </a:p>
+          <a:p>
+            <a:pPr lvl="0" algn="ctr" defTabSz="755650">
+              <a:lnSpc>
+                <a:spcPct val="90000"/>
+              </a:lnSpc>
+              <a:spcBef>
+                <a:spcPct val="0"/>
+              </a:spcBef>
+              <a:spcAft>
+                <a:spcPct val="35000"/>
+              </a:spcAft>
+            </a:pPr>
+            <a:endParaRPr lang="en-US" sz="1700" kern="1200" dirty="0">
+              <a:solidFill>
+                <a:schemeClr val="bg2"/>
+              </a:solidFill>
+            </a:endParaRPr>
+          </a:p>
+        </p:txBody>
+      </p:sp>
+      <p:sp>
+        <p:nvSpPr>
+          <p:cNvPr id="25" name="Rectangle 24"/>
+          <p:cNvSpPr/>
+          <p:nvPr/>
+        </p:nvSpPr>
+        <p:spPr bwMode="auto">
+          <a:xfrm>
+            <a:off x="3496611" y="4476222"/>
+            <a:ext cx="1541122" cy="346672"/>
+          </a:xfrm>
+          <a:prstGeom prst="rect">
+            <a:avLst/>
+          </a:prstGeom>
+          <a:solidFill>
+            <a:schemeClr val="bg2"/>
+          </a:solidFill>
+          <a:ln>
+            <a:noFill/>
+            <a:headEnd type="none" w="med" len="med"/>
+            <a:tailEnd type="none" w="med" len="med"/>
+          </a:ln>
+        </p:spPr>
+        <p:style>
+          <a:lnRef idx="2">
+            <a:schemeClr val="accent1">
+              <a:shade val="50000"/>
+            </a:schemeClr>
+          </a:lnRef>
+          <a:fillRef idx="1">
+            <a:schemeClr val="accent1"/>
+          </a:fillRef>
+          <a:effectRef idx="0">
+            <a:schemeClr val="accent1"/>
+          </a:effectRef>
+          <a:fontRef idx="minor">
+            <a:schemeClr val="lt1"/>
+          </a:fontRef>
+        </p:style>
+        <p:txBody>
+          <a:bodyPr vert="horz" wrap="square" lIns="0" tIns="46637" rIns="0" bIns="46637" numCol="1" rtlCol="0" anchor="ctr" anchorCtr="0" compatLnSpc="1">
+            <a:prstTxWarp prst="textNoShape">
+              <a:avLst/>
+            </a:prstTxWarp>
+          </a:bodyPr>
+          <a:lstStyle/>
+          <a:p>
+            <a:pPr algn="ctr" defTabSz="932472" fontAlgn="base">
+              <a:spcBef>
+                <a:spcPct val="0"/>
+              </a:spcBef>
+              <a:spcAft>
+                <a:spcPct val="0"/>
+              </a:spcAft>
+            </a:pPr>
+            <a:r>
+              <a:rPr lang="en-US" sz="1400" dirty="0" err="1" smtClean="0">
+                <a:solidFill>
                   <a:schemeClr val="tx1"/>
-                </a:fontRef>
-              </p:style>
-            </p:sp>
-            <p:sp>
-              <p:nvSpPr>
-                <p:cNvPr id="9" name="Oval 4"/>
-                <p:cNvSpPr/>
-                <p:nvPr/>
-              </p:nvSpPr>
-              <p:spPr>
-                <a:xfrm>
-                  <a:off x="404868" y="846881"/>
-                  <a:ext cx="1954874" cy="1967872"/>
-                </a:xfrm>
-                <a:prstGeom prst="rect">
-                  <a:avLst/>
-                </a:prstGeom>
-              </p:spPr>
-              <p:style>
-                <a:lnRef idx="0">
-                  <a:scrgbClr r="0" g="0" b="0"/>
-                </a:lnRef>
-                <a:fillRef idx="0">
-                  <a:scrgbClr r="0" g="0" b="0"/>
-                </a:fillRef>
-                <a:effectRef idx="0">
-                  <a:scrgbClr r="0" g="0" b="0"/>
-                </a:effectRef>
-                <a:fontRef idx="minor">
+                </a:solidFill>
+              </a:rPr>
+              <a:t>Async</a:t>
+            </a:r>
+            <a:r>
+              <a:rPr lang="en-US" sz="1400" dirty="0" smtClean="0">
+                <a:solidFill>
                   <a:schemeClr val="tx1"/>
-                </a:fontRef>
-              </p:style>
-              <p:txBody>
-                <a:bodyPr spcFirstLastPara="0" vert="horz" wrap="square" lIns="93919" tIns="21590" rIns="93919" bIns="21590" numCol="1" spcCol="1270" anchor="t" anchorCtr="0">
-                  <a:noAutofit/>
-                </a:bodyPr>
-                <a:lstStyle/>
-                <a:p>
-                  <a:pPr lvl="0" algn="ctr" defTabSz="755650">
-                    <a:lnSpc>
-                      <a:spcPct val="90000"/>
-                    </a:lnSpc>
-                    <a:spcBef>
-                      <a:spcPct val="0"/>
-                    </a:spcBef>
-                    <a:spcAft>
-                      <a:spcPct val="35000"/>
-                    </a:spcAft>
-                  </a:pPr>
-                  <a:r>
-                    <a:rPr lang="en-US" sz="1700" kern="1200" dirty="0" smtClean="0"/>
-                    <a:t>Asynchronous</a:t>
-                  </a:r>
-                  <a:endParaRPr lang="en-US" sz="1700" kern="1200" dirty="0"/>
-                </a:p>
-              </p:txBody>
-            </p:sp>
-          </p:grpSp>
-          <p:grpSp>
-            <p:nvGrpSpPr>
-              <p:cNvPr id="4" name="Group 3"/>
-              <p:cNvGrpSpPr/>
-              <p:nvPr/>
-            </p:nvGrpSpPr>
-            <p:grpSpPr>
-              <a:xfrm>
-                <a:off x="6336314" y="2510110"/>
-                <a:ext cx="3200400" cy="3200400"/>
-                <a:chOff x="6511325" y="2426545"/>
-                <a:chExt cx="3200400" cy="3200400"/>
-              </a:xfrm>
-            </p:grpSpPr>
-            <p:grpSp>
-              <p:nvGrpSpPr>
-                <p:cNvPr id="13" name="Group 12"/>
-                <p:cNvGrpSpPr/>
-                <p:nvPr/>
-              </p:nvGrpSpPr>
-              <p:grpSpPr>
-                <a:xfrm>
-                  <a:off x="6511325" y="2426545"/>
-                  <a:ext cx="3200400" cy="3200400"/>
-                  <a:chOff x="3157989" y="2202872"/>
-                  <a:chExt cx="1706591" cy="698200"/>
-                </a:xfrm>
-              </p:grpSpPr>
-              <p:sp>
-                <p:nvSpPr>
-                  <p:cNvPr id="14" name="Oval 13"/>
-                  <p:cNvSpPr/>
-                  <p:nvPr/>
-                </p:nvSpPr>
-                <p:spPr>
-                  <a:xfrm>
-                    <a:off x="3157989" y="2202872"/>
-                    <a:ext cx="1706591" cy="698200"/>
-                  </a:xfrm>
-                  <a:prstGeom prst="ellipse">
-                    <a:avLst/>
-                  </a:prstGeom>
-                  <a:solidFill>
-                    <a:srgbClr val="FF0000">
-                      <a:alpha val="50000"/>
-                    </a:srgbClr>
-                  </a:solidFill>
-                </p:spPr>
-                <p:style>
-                  <a:lnRef idx="2">
-                    <a:schemeClr val="lt1">
-                      <a:hueOff val="0"/>
-                      <a:satOff val="0"/>
-                      <a:lumOff val="0"/>
-                      <a:alphaOff val="0"/>
-                    </a:schemeClr>
-                  </a:lnRef>
-                  <a:fillRef idx="1">
-                    <a:scrgbClr r="0" g="0" b="0"/>
-                  </a:fillRef>
-                  <a:effectRef idx="0">
-                    <a:schemeClr val="accent1">
-                      <a:alpha val="50000"/>
-                      <a:hueOff val="0"/>
-                      <a:satOff val="0"/>
-                      <a:lumOff val="0"/>
-                      <a:alphaOff val="0"/>
-                    </a:schemeClr>
-                  </a:effectRef>
-                  <a:fontRef idx="minor">
-                    <a:schemeClr val="tx1"/>
-                  </a:fontRef>
-                </p:style>
-              </p:sp>
-              <p:sp>
-                <p:nvSpPr>
-                  <p:cNvPr id="15" name="Oval 4"/>
-                  <p:cNvSpPr/>
-                  <p:nvPr/>
-                </p:nvSpPr>
-                <p:spPr>
-                  <a:xfrm>
-                    <a:off x="3407913" y="2305121"/>
-                    <a:ext cx="1206743" cy="493702"/>
-                  </a:xfrm>
-                  <a:prstGeom prst="rect">
-                    <a:avLst/>
-                  </a:prstGeom>
-                </p:spPr>
-                <p:style>
-                  <a:lnRef idx="0">
-                    <a:scrgbClr r="0" g="0" b="0"/>
-                  </a:lnRef>
-                  <a:fillRef idx="0">
-                    <a:scrgbClr r="0" g="0" b="0"/>
-                  </a:fillRef>
-                  <a:effectRef idx="0">
-                    <a:scrgbClr r="0" g="0" b="0"/>
-                  </a:effectRef>
-                  <a:fontRef idx="minor">
-                    <a:schemeClr val="tx1"/>
-                  </a:fontRef>
-                </p:style>
-                <p:txBody>
-                  <a:bodyPr spcFirstLastPara="0" vert="horz" wrap="square" lIns="93919" tIns="21590" rIns="93919" bIns="21590" numCol="1" spcCol="1270" anchor="t" anchorCtr="0">
-                    <a:noAutofit/>
-                  </a:bodyPr>
-                  <a:lstStyle/>
-                  <a:p>
-                    <a:pPr lvl="0" algn="ctr" defTabSz="755650">
-                      <a:lnSpc>
-                        <a:spcPct val="90000"/>
-                      </a:lnSpc>
-                      <a:spcBef>
-                        <a:spcPct val="0"/>
-                      </a:spcBef>
-                      <a:spcAft>
-                        <a:spcPct val="35000"/>
-                      </a:spcAft>
-                    </a:pPr>
-                    <a:r>
-                      <a:rPr lang="en-US" sz="1700" kern="1200" dirty="0" smtClean="0"/>
-                      <a:t>Multithreaded</a:t>
-                    </a:r>
-                    <a:endParaRPr lang="en-US" sz="1700" kern="1200" dirty="0"/>
-                  </a:p>
-                </p:txBody>
-              </p:sp>
-            </p:grpSp>
-            <p:grpSp>
-              <p:nvGrpSpPr>
-                <p:cNvPr id="10" name="Group 9"/>
-                <p:cNvGrpSpPr/>
-                <p:nvPr/>
-              </p:nvGrpSpPr>
-              <p:grpSpPr>
-                <a:xfrm>
-                  <a:off x="7258230" y="3677645"/>
-                  <a:ext cx="1706591" cy="698200"/>
-                  <a:chOff x="3157989" y="2202872"/>
-                  <a:chExt cx="1706591" cy="698200"/>
-                </a:xfrm>
-              </p:grpSpPr>
-              <p:sp>
-                <p:nvSpPr>
-                  <p:cNvPr id="11" name="Oval 10"/>
-                  <p:cNvSpPr/>
-                  <p:nvPr/>
-                </p:nvSpPr>
-                <p:spPr>
-                  <a:xfrm>
-                    <a:off x="3157989" y="2202872"/>
-                    <a:ext cx="1706591" cy="698200"/>
-                  </a:xfrm>
-                  <a:prstGeom prst="ellipse">
-                    <a:avLst/>
-                  </a:prstGeom>
-                  <a:solidFill>
-                    <a:srgbClr val="FF0000">
-                      <a:alpha val="50000"/>
-                    </a:srgbClr>
-                  </a:solidFill>
-                </p:spPr>
-                <p:style>
-                  <a:lnRef idx="2">
-                    <a:schemeClr val="lt1">
-                      <a:hueOff val="0"/>
-                      <a:satOff val="0"/>
-                      <a:lumOff val="0"/>
-                      <a:alphaOff val="0"/>
-                    </a:schemeClr>
-                  </a:lnRef>
-                  <a:fillRef idx="1">
-                    <a:scrgbClr r="0" g="0" b="0"/>
-                  </a:fillRef>
-                  <a:effectRef idx="0">
-                    <a:schemeClr val="accent1">
-                      <a:alpha val="50000"/>
-                      <a:hueOff val="0"/>
-                      <a:satOff val="0"/>
-                      <a:lumOff val="0"/>
-                      <a:alphaOff val="0"/>
-                    </a:schemeClr>
-                  </a:effectRef>
-                  <a:fontRef idx="minor">
-                    <a:schemeClr val="tx1"/>
-                  </a:fontRef>
-                </p:style>
-              </p:sp>
-              <p:sp>
-                <p:nvSpPr>
-                  <p:cNvPr id="12" name="Oval 4"/>
-                  <p:cNvSpPr/>
-                  <p:nvPr/>
-                </p:nvSpPr>
-                <p:spPr>
-                  <a:xfrm>
-                    <a:off x="3407913" y="2305121"/>
-                    <a:ext cx="1206743" cy="493702"/>
-                  </a:xfrm>
-                  <a:prstGeom prst="rect">
-                    <a:avLst/>
-                  </a:prstGeom>
-                </p:spPr>
-                <p:style>
-                  <a:lnRef idx="0">
-                    <a:scrgbClr r="0" g="0" b="0"/>
-                  </a:lnRef>
-                  <a:fillRef idx="0">
-                    <a:scrgbClr r="0" g="0" b="0"/>
-                  </a:fillRef>
-                  <a:effectRef idx="0">
-                    <a:scrgbClr r="0" g="0" b="0"/>
-                  </a:effectRef>
-                  <a:fontRef idx="minor">
-                    <a:schemeClr val="tx1"/>
-                  </a:fontRef>
-                </p:style>
-                <p:txBody>
-                  <a:bodyPr spcFirstLastPara="0" vert="horz" wrap="square" lIns="93919" tIns="21590" rIns="93919" bIns="21590" numCol="1" spcCol="1270" anchor="ctr" anchorCtr="0">
-                    <a:noAutofit/>
-                  </a:bodyPr>
-                  <a:lstStyle/>
-                  <a:p>
-                    <a:pPr lvl="0" algn="ctr" defTabSz="755650">
-                      <a:lnSpc>
-                        <a:spcPct val="90000"/>
-                      </a:lnSpc>
-                      <a:spcBef>
-                        <a:spcPct val="0"/>
-                      </a:spcBef>
-                      <a:spcAft>
-                        <a:spcPct val="35000"/>
-                      </a:spcAft>
-                    </a:pPr>
-                    <a:r>
-                      <a:rPr lang="en-US" sz="1700" kern="1200" dirty="0" smtClean="0"/>
-                      <a:t>Parallel</a:t>
-                    </a:r>
-                    <a:endParaRPr lang="en-US" sz="1700" kern="1200" dirty="0"/>
-                  </a:p>
-                </p:txBody>
-              </p:sp>
-            </p:grpSp>
-          </p:grpSp>
-        </p:grpSp>
-      </p:grpSp>
+                </a:solidFill>
+              </a:rPr>
+              <a:t>/Await</a:t>
+            </a:r>
+          </a:p>
+        </p:txBody>
+      </p:sp>
+      <p:sp>
+        <p:nvSpPr>
+          <p:cNvPr id="26" name="Rectangle 25"/>
+          <p:cNvSpPr/>
+          <p:nvPr/>
+        </p:nvSpPr>
+        <p:spPr bwMode="auto">
+          <a:xfrm>
+            <a:off x="3496611" y="3312764"/>
+            <a:ext cx="1541122" cy="346672"/>
+          </a:xfrm>
+          <a:prstGeom prst="rect">
+            <a:avLst/>
+          </a:prstGeom>
+          <a:solidFill>
+            <a:schemeClr val="bg2"/>
+          </a:solidFill>
+          <a:ln>
+            <a:noFill/>
+            <a:headEnd type="none" w="med" len="med"/>
+            <a:tailEnd type="none" w="med" len="med"/>
+          </a:ln>
+        </p:spPr>
+        <p:style>
+          <a:lnRef idx="2">
+            <a:schemeClr val="accent1">
+              <a:shade val="50000"/>
+            </a:schemeClr>
+          </a:lnRef>
+          <a:fillRef idx="1">
+            <a:schemeClr val="accent1"/>
+          </a:fillRef>
+          <a:effectRef idx="0">
+            <a:schemeClr val="accent1"/>
+          </a:effectRef>
+          <a:fontRef idx="minor">
+            <a:schemeClr val="lt1"/>
+          </a:fontRef>
+        </p:style>
+        <p:txBody>
+          <a:bodyPr vert="horz" wrap="square" lIns="0" tIns="46637" rIns="0" bIns="46637" numCol="1" rtlCol="0" anchor="ctr" anchorCtr="0" compatLnSpc="1">
+            <a:prstTxWarp prst="textNoShape">
+              <a:avLst/>
+            </a:prstTxWarp>
+          </a:bodyPr>
+          <a:lstStyle/>
+          <a:p>
+            <a:pPr algn="ctr" defTabSz="932472" fontAlgn="base">
+              <a:spcBef>
+                <a:spcPct val="0"/>
+              </a:spcBef>
+              <a:spcAft>
+                <a:spcPct val="0"/>
+              </a:spcAft>
+            </a:pPr>
+            <a:r>
+              <a:rPr lang="en-US" sz="1400" dirty="0" smtClean="0">
+                <a:solidFill>
+                  <a:schemeClr val="tx1"/>
+                </a:solidFill>
+              </a:rPr>
+              <a:t>Rx</a:t>
+            </a:r>
+          </a:p>
+        </p:txBody>
+      </p:sp>
+      <p:sp>
+        <p:nvSpPr>
+          <p:cNvPr id="27" name="Oval 26"/>
+          <p:cNvSpPr/>
+          <p:nvPr/>
+        </p:nvSpPr>
+        <p:spPr>
+          <a:xfrm>
+            <a:off x="6564914" y="3809346"/>
+            <a:ext cx="2743200" cy="1237607"/>
+          </a:xfrm>
+          <a:prstGeom prst="ellipse">
+            <a:avLst/>
+          </a:prstGeom>
+          <a:noFill/>
+          <a:ln w="38100">
+            <a:solidFill>
+              <a:schemeClr val="accent1"/>
+            </a:solidFill>
+            <a:prstDash val="solid"/>
+          </a:ln>
+        </p:spPr>
+        <p:style>
+          <a:lnRef idx="2">
+            <a:schemeClr val="lt1">
+              <a:hueOff val="0"/>
+              <a:satOff val="0"/>
+              <a:lumOff val="0"/>
+              <a:alphaOff val="0"/>
+            </a:schemeClr>
+          </a:lnRef>
+          <a:fillRef idx="1">
+            <a:scrgbClr r="0" g="0" b="0"/>
+          </a:fillRef>
+          <a:effectRef idx="0">
+            <a:schemeClr val="accent1">
+              <a:alpha val="50000"/>
+              <a:hueOff val="0"/>
+              <a:satOff val="0"/>
+              <a:lumOff val="0"/>
+              <a:alphaOff val="0"/>
+            </a:schemeClr>
+          </a:effectRef>
+          <a:fontRef idx="minor">
+            <a:schemeClr val="tx1"/>
+          </a:fontRef>
+        </p:style>
+      </p:sp>
+      <p:sp>
+        <p:nvSpPr>
+          <p:cNvPr id="28" name="Oval 4"/>
+          <p:cNvSpPr/>
+          <p:nvPr/>
+        </p:nvSpPr>
+        <p:spPr>
+          <a:xfrm>
+            <a:off x="7026537" y="4121372"/>
+            <a:ext cx="1819954" cy="613557"/>
+          </a:xfrm>
+          <a:prstGeom prst="rect">
+            <a:avLst/>
+          </a:prstGeom>
+        </p:spPr>
+        <p:style>
+          <a:lnRef idx="0">
+            <a:scrgbClr r="0" g="0" b="0"/>
+          </a:lnRef>
+          <a:fillRef idx="0">
+            <a:scrgbClr r="0" g="0" b="0"/>
+          </a:fillRef>
+          <a:effectRef idx="0">
+            <a:scrgbClr r="0" g="0" b="0"/>
+          </a:effectRef>
+          <a:fontRef idx="minor">
+            <a:schemeClr val="tx1"/>
+          </a:fontRef>
+        </p:style>
+        <p:txBody>
+          <a:bodyPr spcFirstLastPara="0" vert="horz" wrap="square" lIns="93919" tIns="21590" rIns="93919" bIns="21590" numCol="1" spcCol="1270" anchor="ctr" anchorCtr="0">
+            <a:noAutofit/>
+          </a:bodyPr>
+          <a:lstStyle/>
+          <a:p>
+            <a:pPr lvl="0" algn="ctr" defTabSz="755650">
+              <a:lnSpc>
+                <a:spcPct val="90000"/>
+              </a:lnSpc>
+              <a:spcBef>
+                <a:spcPct val="0"/>
+              </a:spcBef>
+              <a:spcAft>
+                <a:spcPct val="35000"/>
+              </a:spcAft>
+            </a:pPr>
+            <a:r>
+              <a:rPr lang="en-US" sz="1700" kern="1200" dirty="0" smtClean="0">
+                <a:solidFill>
+                  <a:schemeClr val="bg2"/>
+                </a:solidFill>
+              </a:rPr>
+              <a:t>Parallel</a:t>
+            </a:r>
+          </a:p>
+          <a:p>
+            <a:pPr lvl="0" algn="ctr" defTabSz="755650">
+              <a:lnSpc>
+                <a:spcPct val="90000"/>
+              </a:lnSpc>
+              <a:spcBef>
+                <a:spcPct val="0"/>
+              </a:spcBef>
+              <a:spcAft>
+                <a:spcPct val="35000"/>
+              </a:spcAft>
+            </a:pPr>
+            <a:endParaRPr lang="en-US" sz="1700" kern="1200" dirty="0">
+              <a:solidFill>
+                <a:schemeClr val="bg2"/>
+              </a:solidFill>
+            </a:endParaRPr>
+          </a:p>
+        </p:txBody>
+      </p:sp>
+      <p:sp>
+        <p:nvSpPr>
+          <p:cNvPr id="29" name="Rectangle 28"/>
+          <p:cNvSpPr/>
+          <p:nvPr/>
+        </p:nvSpPr>
+        <p:spPr bwMode="auto">
+          <a:xfrm>
+            <a:off x="7165953" y="4477894"/>
+            <a:ext cx="1541122" cy="346672"/>
+          </a:xfrm>
+          <a:prstGeom prst="rect">
+            <a:avLst/>
+          </a:prstGeom>
+          <a:solidFill>
+            <a:schemeClr val="bg2"/>
+          </a:solidFill>
+          <a:ln>
+            <a:noFill/>
+            <a:headEnd type="none" w="med" len="med"/>
+            <a:tailEnd type="none" w="med" len="med"/>
+          </a:ln>
+        </p:spPr>
+        <p:style>
+          <a:lnRef idx="2">
+            <a:schemeClr val="accent1">
+              <a:shade val="50000"/>
+            </a:schemeClr>
+          </a:lnRef>
+          <a:fillRef idx="1">
+            <a:schemeClr val="accent1"/>
+          </a:fillRef>
+          <a:effectRef idx="0">
+            <a:schemeClr val="accent1"/>
+          </a:effectRef>
+          <a:fontRef idx="minor">
+            <a:schemeClr val="lt1"/>
+          </a:fontRef>
+        </p:style>
+        <p:txBody>
+          <a:bodyPr vert="horz" wrap="square" lIns="0" tIns="46637" rIns="0" bIns="46637" numCol="1" rtlCol="0" anchor="ctr" anchorCtr="0" compatLnSpc="1">
+            <a:prstTxWarp prst="textNoShape">
+              <a:avLst/>
+            </a:prstTxWarp>
+          </a:bodyPr>
+          <a:lstStyle/>
+          <a:p>
+            <a:pPr algn="ctr" defTabSz="932472" fontAlgn="base">
+              <a:spcBef>
+                <a:spcPct val="0"/>
+              </a:spcBef>
+              <a:spcAft>
+                <a:spcPct val="0"/>
+              </a:spcAft>
+            </a:pPr>
+            <a:r>
+              <a:rPr lang="en-US" sz="1400" dirty="0" smtClean="0">
+                <a:solidFill>
+                  <a:schemeClr val="tx1"/>
+                </a:solidFill>
+              </a:rPr>
+              <a:t>PLINQ, Parallel</a:t>
+            </a:r>
+          </a:p>
+        </p:txBody>
+      </p:sp>
+      <p:sp>
+        <p:nvSpPr>
+          <p:cNvPr id="30" name="Rectangle 29"/>
+          <p:cNvSpPr/>
+          <p:nvPr/>
+        </p:nvSpPr>
+        <p:spPr bwMode="auto">
+          <a:xfrm>
+            <a:off x="7165700" y="3312106"/>
+            <a:ext cx="1541122" cy="346672"/>
+          </a:xfrm>
+          <a:prstGeom prst="rect">
+            <a:avLst/>
+          </a:prstGeom>
+          <a:solidFill>
+            <a:schemeClr val="bg2"/>
+          </a:solidFill>
+          <a:ln>
+            <a:noFill/>
+            <a:headEnd type="none" w="med" len="med"/>
+            <a:tailEnd type="none" w="med" len="med"/>
+          </a:ln>
+        </p:spPr>
+        <p:style>
+          <a:lnRef idx="2">
+            <a:schemeClr val="accent1">
+              <a:shade val="50000"/>
+            </a:schemeClr>
+          </a:lnRef>
+          <a:fillRef idx="1">
+            <a:schemeClr val="accent1"/>
+          </a:fillRef>
+          <a:effectRef idx="0">
+            <a:schemeClr val="accent1"/>
+          </a:effectRef>
+          <a:fontRef idx="minor">
+            <a:schemeClr val="lt1"/>
+          </a:fontRef>
+        </p:style>
+        <p:txBody>
+          <a:bodyPr vert="horz" wrap="square" lIns="0" tIns="46637" rIns="0" bIns="46637" numCol="1" rtlCol="0" anchor="ctr" anchorCtr="0" compatLnSpc="1">
+            <a:prstTxWarp prst="textNoShape">
+              <a:avLst/>
+            </a:prstTxWarp>
+          </a:bodyPr>
+          <a:lstStyle/>
+          <a:p>
+            <a:pPr algn="ctr" defTabSz="932472" fontAlgn="base">
+              <a:spcBef>
+                <a:spcPct val="0"/>
+              </a:spcBef>
+              <a:spcAft>
+                <a:spcPct val="0"/>
+              </a:spcAft>
+            </a:pPr>
+            <a:r>
+              <a:rPr lang="en-US" sz="1400" dirty="0" err="1" smtClean="0">
+                <a:solidFill>
+                  <a:schemeClr val="tx1"/>
+                </a:solidFill>
+              </a:rPr>
+              <a:t>Task.Run</a:t>
+            </a:r>
+            <a:endParaRPr lang="en-US" sz="1400" dirty="0" smtClean="0">
+              <a:solidFill>
+                <a:schemeClr val="tx1"/>
+              </a:solidFill>
+            </a:endParaRPr>
+          </a:p>
+        </p:txBody>
+      </p:sp>
+      <p:sp>
+        <p:nvSpPr>
+          <p:cNvPr id="31" name="Rectangle 30"/>
+          <p:cNvSpPr/>
+          <p:nvPr/>
+        </p:nvSpPr>
+        <p:spPr bwMode="auto">
+          <a:xfrm>
+            <a:off x="5336898" y="2102430"/>
+            <a:ext cx="1541122" cy="346672"/>
+          </a:xfrm>
+          <a:prstGeom prst="rect">
+            <a:avLst/>
+          </a:prstGeom>
+          <a:solidFill>
+            <a:schemeClr val="bg2"/>
+          </a:solidFill>
+          <a:ln w="25400">
+            <a:noFill/>
+            <a:headEnd type="none" w="med" len="med"/>
+            <a:tailEnd type="none" w="med" len="med"/>
+          </a:ln>
+        </p:spPr>
+        <p:style>
+          <a:lnRef idx="2">
+            <a:schemeClr val="accent1">
+              <a:shade val="50000"/>
+            </a:schemeClr>
+          </a:lnRef>
+          <a:fillRef idx="1">
+            <a:schemeClr val="accent1"/>
+          </a:fillRef>
+          <a:effectRef idx="0">
+            <a:schemeClr val="accent1"/>
+          </a:effectRef>
+          <a:fontRef idx="minor">
+            <a:schemeClr val="lt1"/>
+          </a:fontRef>
+        </p:style>
+        <p:txBody>
+          <a:bodyPr vert="horz" wrap="square" lIns="0" tIns="46637" rIns="0" bIns="46637" numCol="1" rtlCol="0" anchor="ctr" anchorCtr="0" compatLnSpc="1">
+            <a:prstTxWarp prst="textNoShape">
+              <a:avLst/>
+            </a:prstTxWarp>
+          </a:bodyPr>
+          <a:lstStyle/>
+          <a:p>
+            <a:pPr algn="ctr" defTabSz="932472" fontAlgn="base">
+              <a:spcBef>
+                <a:spcPct val="0"/>
+              </a:spcBef>
+              <a:spcAft>
+                <a:spcPct val="0"/>
+              </a:spcAft>
+            </a:pPr>
+            <a:r>
+              <a:rPr lang="en-US" sz="1400" dirty="0" smtClean="0">
+                <a:solidFill>
+                  <a:schemeClr val="tx1"/>
+                </a:solidFill>
+              </a:rPr>
+              <a:t>Dataflow</a:t>
+            </a:r>
+          </a:p>
+        </p:txBody>
+      </p:sp>
+      <p:sp>
+        <p:nvSpPr>
+          <p:cNvPr id="32" name="Oval 4"/>
+          <p:cNvSpPr/>
+          <p:nvPr/>
+        </p:nvSpPr>
+        <p:spPr>
+          <a:xfrm>
+            <a:off x="4975946" y="1544025"/>
+            <a:ext cx="2263026" cy="2263025"/>
+          </a:xfrm>
+          <a:prstGeom prst="rect">
+            <a:avLst/>
+          </a:prstGeom>
+        </p:spPr>
+        <p:style>
+          <a:lnRef idx="0">
+            <a:scrgbClr r="0" g="0" b="0"/>
+          </a:lnRef>
+          <a:fillRef idx="0">
+            <a:scrgbClr r="0" g="0" b="0"/>
+          </a:fillRef>
+          <a:effectRef idx="0">
+            <a:scrgbClr r="0" g="0" b="0"/>
+          </a:effectRef>
+          <a:fontRef idx="minor">
+            <a:schemeClr val="tx1"/>
+          </a:fontRef>
+        </p:style>
+        <p:txBody>
+          <a:bodyPr spcFirstLastPara="0" vert="horz" wrap="square" lIns="93919" tIns="21590" rIns="93919" bIns="21590" numCol="1" spcCol="1270" anchor="t" anchorCtr="0">
+            <a:noAutofit/>
+          </a:bodyPr>
+          <a:lstStyle/>
+          <a:p>
+            <a:pPr lvl="0" algn="ctr" defTabSz="755650">
+              <a:lnSpc>
+                <a:spcPct val="90000"/>
+              </a:lnSpc>
+              <a:spcBef>
+                <a:spcPct val="0"/>
+              </a:spcBef>
+              <a:spcAft>
+                <a:spcPct val="35000"/>
+              </a:spcAft>
+            </a:pPr>
+            <a:r>
+              <a:rPr lang="en-US" sz="3200" kern="1200" dirty="0" smtClean="0">
+                <a:solidFill>
+                  <a:schemeClr val="bg2"/>
+                </a:solidFill>
+              </a:rPr>
+              <a:t>Concurrent</a:t>
+            </a:r>
+          </a:p>
+        </p:txBody>
+      </p:sp>
+      <p:sp>
+        <p:nvSpPr>
+          <p:cNvPr id="3" name="Multiply 2"/>
+          <p:cNvSpPr/>
+          <p:nvPr/>
+        </p:nvSpPr>
+        <p:spPr bwMode="auto">
+          <a:xfrm>
+            <a:off x="5520752" y="1674699"/>
+            <a:ext cx="4834673" cy="4863260"/>
+          </a:xfrm>
+          <a:prstGeom prst="mathMultiply">
+            <a:avLst/>
+          </a:prstGeom>
+          <a:solidFill>
+            <a:schemeClr val="accent3">
+              <a:alpha val="38000"/>
+            </a:schemeClr>
+          </a:solidFill>
+          <a:ln w="63500">
+            <a:solidFill>
+              <a:schemeClr val="accent3"/>
+            </a:solidFill>
+            <a:headEnd type="none" w="med" len="med"/>
+            <a:tailEnd type="none" w="med" len="med"/>
+          </a:ln>
+        </p:spPr>
+        <p:style>
+          <a:lnRef idx="2">
+            <a:schemeClr val="accent1">
+              <a:shade val="50000"/>
+            </a:schemeClr>
+          </a:lnRef>
+          <a:fillRef idx="1">
+            <a:schemeClr val="accent1"/>
+          </a:fillRef>
+          <a:effectRef idx="0">
+            <a:schemeClr val="accent1"/>
+          </a:effectRef>
+          <a:fontRef idx="minor">
+            <a:schemeClr val="lt1"/>
+          </a:fontRef>
+        </p:style>
+        <p:txBody>
+          <a:bodyPr vert="horz" wrap="square" lIns="0" tIns="46637" rIns="0" bIns="46637" numCol="1" rtlCol="0" anchor="ctr" anchorCtr="0" compatLnSpc="1">
+            <a:prstTxWarp prst="textNoShape">
+              <a:avLst/>
+            </a:prstTxWarp>
+          </a:bodyPr>
+          <a:lstStyle/>
+          <a:p>
+            <a:pPr algn="ctr" defTabSz="932472" fontAlgn="base">
+              <a:spcBef>
+                <a:spcPct val="0"/>
+              </a:spcBef>
+              <a:spcAft>
+                <a:spcPct val="0"/>
+              </a:spcAft>
+            </a:pPr>
+            <a:endParaRPr lang="en-US" sz="2000" dirty="0">
+              <a:gradFill>
+                <a:gsLst>
+                  <a:gs pos="0">
+                    <a:srgbClr val="FFFFFF"/>
+                  </a:gs>
+                  <a:gs pos="100000">
+                    <a:srgbClr val="FFFFFF"/>
+                  </a:gs>
+                </a:gsLst>
+                <a:lin ang="5400000" scaled="0"/>
+              </a:gradFill>
+            </a:endParaRPr>
+          </a:p>
+        </p:txBody>
+      </p:sp>
     </p:spTree>
     <p:extLst>
       <p:ext uri="{BB962C8B-B14F-4D97-AF65-F5344CB8AC3E}">
@@ -31090,9 +31713,286 @@
   <p:timing>
     <p:tnLst>
       <p:par>
-        <p:cTn id="1" dur="indefinite" restart="never" nodeType="tmRoot"/>
+        <p:cTn id="1" dur="indefinite" restart="never" nodeType="tmRoot">
+          <p:childTnLst>
+            <p:seq concurrent="1" nextAc="seek">
+              <p:cTn id="2" dur="indefinite" nodeType="mainSeq">
+                <p:childTnLst>
+                  <p:par>
+                    <p:cTn id="3" fill="hold">
+                      <p:stCondLst>
+                        <p:cond delay="indefinite"/>
+                      </p:stCondLst>
+                      <p:childTnLst>
+                        <p:par>
+                          <p:cTn id="4" fill="hold">
+                            <p:stCondLst>
+                              <p:cond delay="0"/>
+                            </p:stCondLst>
+                            <p:childTnLst>
+                              <p:par>
+                                <p:cTn id="5" presetID="16" presetClass="entr" presetSubtype="21" fill="hold" grpId="0" nodeType="clickEffect">
+                                  <p:stCondLst>
+                                    <p:cond delay="0"/>
+                                  </p:stCondLst>
+                                  <p:childTnLst>
+                                    <p:set>
+                                      <p:cBhvr>
+                                        <p:cTn id="6" dur="1" fill="hold">
+                                          <p:stCondLst>
+                                            <p:cond delay="0"/>
+                                          </p:stCondLst>
+                                        </p:cTn>
+                                        <p:tgtEl>
+                                          <p:spTgt spid="31"/>
+                                        </p:tgtEl>
+                                        <p:attrNameLst>
+                                          <p:attrName>style.visibility</p:attrName>
+                                        </p:attrNameLst>
+                                      </p:cBhvr>
+                                      <p:to>
+                                        <p:strVal val="visible"/>
+                                      </p:to>
+                                    </p:set>
+                                    <p:animEffect transition="in" filter="barn(inVertical)">
+                                      <p:cBhvr>
+                                        <p:cTn id="7" dur="500"/>
+                                        <p:tgtEl>
+                                          <p:spTgt spid="31"/>
+                                        </p:tgtEl>
+                                      </p:cBhvr>
+                                    </p:animEffect>
+                                  </p:childTnLst>
+                                </p:cTn>
+                              </p:par>
+                              <p:par>
+                                <p:cTn id="8" presetID="16" presetClass="entr" presetSubtype="21" fill="hold" grpId="0" nodeType="withEffect">
+                                  <p:stCondLst>
+                                    <p:cond delay="0"/>
+                                  </p:stCondLst>
+                                  <p:childTnLst>
+                                    <p:set>
+                                      <p:cBhvr>
+                                        <p:cTn id="9" dur="1" fill="hold">
+                                          <p:stCondLst>
+                                            <p:cond delay="0"/>
+                                          </p:stCondLst>
+                                        </p:cTn>
+                                        <p:tgtEl>
+                                          <p:spTgt spid="30"/>
+                                        </p:tgtEl>
+                                        <p:attrNameLst>
+                                          <p:attrName>style.visibility</p:attrName>
+                                        </p:attrNameLst>
+                                      </p:cBhvr>
+                                      <p:to>
+                                        <p:strVal val="visible"/>
+                                      </p:to>
+                                    </p:set>
+                                    <p:animEffect transition="in" filter="barn(inVertical)">
+                                      <p:cBhvr>
+                                        <p:cTn id="10" dur="500"/>
+                                        <p:tgtEl>
+                                          <p:spTgt spid="30"/>
+                                        </p:tgtEl>
+                                      </p:cBhvr>
+                                    </p:animEffect>
+                                  </p:childTnLst>
+                                </p:cTn>
+                              </p:par>
+                              <p:par>
+                                <p:cTn id="11" presetID="16" presetClass="entr" presetSubtype="21" fill="hold" grpId="0" nodeType="withEffect">
+                                  <p:stCondLst>
+                                    <p:cond delay="0"/>
+                                  </p:stCondLst>
+                                  <p:childTnLst>
+                                    <p:set>
+                                      <p:cBhvr>
+                                        <p:cTn id="12" dur="1" fill="hold">
+                                          <p:stCondLst>
+                                            <p:cond delay="0"/>
+                                          </p:stCondLst>
+                                        </p:cTn>
+                                        <p:tgtEl>
+                                          <p:spTgt spid="29"/>
+                                        </p:tgtEl>
+                                        <p:attrNameLst>
+                                          <p:attrName>style.visibility</p:attrName>
+                                        </p:attrNameLst>
+                                      </p:cBhvr>
+                                      <p:to>
+                                        <p:strVal val="visible"/>
+                                      </p:to>
+                                    </p:set>
+                                    <p:animEffect transition="in" filter="barn(inVertical)">
+                                      <p:cBhvr>
+                                        <p:cTn id="13" dur="500"/>
+                                        <p:tgtEl>
+                                          <p:spTgt spid="29"/>
+                                        </p:tgtEl>
+                                      </p:cBhvr>
+                                    </p:animEffect>
+                                  </p:childTnLst>
+                                </p:cTn>
+                              </p:par>
+                              <p:par>
+                                <p:cTn id="14" presetID="16" presetClass="entr" presetSubtype="21" fill="hold" grpId="0" nodeType="withEffect">
+                                  <p:stCondLst>
+                                    <p:cond delay="0"/>
+                                  </p:stCondLst>
+                                  <p:childTnLst>
+                                    <p:set>
+                                      <p:cBhvr>
+                                        <p:cTn id="15" dur="1" fill="hold">
+                                          <p:stCondLst>
+                                            <p:cond delay="0"/>
+                                          </p:stCondLst>
+                                        </p:cTn>
+                                        <p:tgtEl>
+                                          <p:spTgt spid="26"/>
+                                        </p:tgtEl>
+                                        <p:attrNameLst>
+                                          <p:attrName>style.visibility</p:attrName>
+                                        </p:attrNameLst>
+                                      </p:cBhvr>
+                                      <p:to>
+                                        <p:strVal val="visible"/>
+                                      </p:to>
+                                    </p:set>
+                                    <p:animEffect transition="in" filter="barn(inVertical)">
+                                      <p:cBhvr>
+                                        <p:cTn id="16" dur="500"/>
+                                        <p:tgtEl>
+                                          <p:spTgt spid="26"/>
+                                        </p:tgtEl>
+                                      </p:cBhvr>
+                                    </p:animEffect>
+                                  </p:childTnLst>
+                                </p:cTn>
+                              </p:par>
+                              <p:par>
+                                <p:cTn id="17" presetID="16" presetClass="entr" presetSubtype="21" fill="hold" grpId="0" nodeType="withEffect">
+                                  <p:stCondLst>
+                                    <p:cond delay="0"/>
+                                  </p:stCondLst>
+                                  <p:childTnLst>
+                                    <p:set>
+                                      <p:cBhvr>
+                                        <p:cTn id="18" dur="1" fill="hold">
+                                          <p:stCondLst>
+                                            <p:cond delay="0"/>
+                                          </p:stCondLst>
+                                        </p:cTn>
+                                        <p:tgtEl>
+                                          <p:spTgt spid="25"/>
+                                        </p:tgtEl>
+                                        <p:attrNameLst>
+                                          <p:attrName>style.visibility</p:attrName>
+                                        </p:attrNameLst>
+                                      </p:cBhvr>
+                                      <p:to>
+                                        <p:strVal val="visible"/>
+                                      </p:to>
+                                    </p:set>
+                                    <p:animEffect transition="in" filter="barn(inVertical)">
+                                      <p:cBhvr>
+                                        <p:cTn id="19" dur="500"/>
+                                        <p:tgtEl>
+                                          <p:spTgt spid="25"/>
+                                        </p:tgtEl>
+                                      </p:cBhvr>
+                                    </p:animEffect>
+                                  </p:childTnLst>
+                                </p:cTn>
+                              </p:par>
+                            </p:childTnLst>
+                          </p:cTn>
+                        </p:par>
+                      </p:childTnLst>
+                    </p:cTn>
+                  </p:par>
+                  <p:par>
+                    <p:cTn id="20" fill="hold">
+                      <p:stCondLst>
+                        <p:cond delay="indefinite"/>
+                      </p:stCondLst>
+                      <p:childTnLst>
+                        <p:par>
+                          <p:cTn id="21" fill="hold">
+                            <p:stCondLst>
+                              <p:cond delay="0"/>
+                            </p:stCondLst>
+                            <p:childTnLst>
+                              <p:par>
+                                <p:cTn id="22" presetID="10" presetClass="entr" presetSubtype="0" fill="hold" grpId="0" nodeType="clickEffect">
+                                  <p:stCondLst>
+                                    <p:cond delay="0"/>
+                                  </p:stCondLst>
+                                  <p:childTnLst>
+                                    <p:set>
+                                      <p:cBhvr>
+                                        <p:cTn id="23" dur="1" fill="hold">
+                                          <p:stCondLst>
+                                            <p:cond delay="0"/>
+                                          </p:stCondLst>
+                                        </p:cTn>
+                                        <p:tgtEl>
+                                          <p:spTgt spid="3"/>
+                                        </p:tgtEl>
+                                        <p:attrNameLst>
+                                          <p:attrName>style.visibility</p:attrName>
+                                        </p:attrNameLst>
+                                      </p:cBhvr>
+                                      <p:to>
+                                        <p:strVal val="visible"/>
+                                      </p:to>
+                                    </p:set>
+                                    <p:animEffect transition="in" filter="fade">
+                                      <p:cBhvr>
+                                        <p:cTn id="24" dur="500"/>
+                                        <p:tgtEl>
+                                          <p:spTgt spid="3"/>
+                                        </p:tgtEl>
+                                      </p:cBhvr>
+                                    </p:animEffect>
+                                  </p:childTnLst>
+                                </p:cTn>
+                              </p:par>
+                            </p:childTnLst>
+                          </p:cTn>
+                        </p:par>
+                      </p:childTnLst>
+                    </p:cTn>
+                  </p:par>
+                </p:childTnLst>
+              </p:cTn>
+              <p:prevCondLst>
+                <p:cond evt="onPrev" delay="0">
+                  <p:tgtEl>
+                    <p:sldTgt/>
+                  </p:tgtEl>
+                </p:cond>
+              </p:prevCondLst>
+              <p:nextCondLst>
+                <p:cond evt="onNext" delay="0">
+                  <p:tgtEl>
+                    <p:sldTgt/>
+                  </p:tgtEl>
+                </p:cond>
+              </p:nextCondLst>
+            </p:seq>
+          </p:childTnLst>
+        </p:cTn>
       </p:par>
     </p:tnLst>
+    <p:bldLst>
+      <p:bldP spid="25" grpId="0" animBg="1"/>
+      <p:bldP spid="26" grpId="0" animBg="1"/>
+      <p:bldP spid="29" grpId="0" animBg="1"/>
+      <p:bldP spid="30" grpId="0" animBg="1"/>
+      <p:bldP spid="31" grpId="0" animBg="1"/>
+      <p:bldP spid="3" grpId="0" animBg="1"/>
+    </p:bldLst>
   </p:timing>
 </p:sld>
 </file>

</xml_diff>